<commit_message>
Resource flared_joint_figures.pptx: Created "groups" for both diagrams.
</commit_message>
<xml_diff>
--- a/V3.1.1/resources/flared_joint_figures.pptx
+++ b/V3.1.1/resources/flared_joint_figures.pptx
@@ -104,6 +104,11 @@
       </a:defRPr>
     </a:lvl9pPr>
   </p:defaultTextStyle>
+  <p:extLst>
+    <p:ext uri="{EFAFB233-063F-42B5-8137-9DF3F51BA10A}">
+      <p15:sldGuideLst xmlns:p15="http://schemas.microsoft.com/office/powerpoint/2012/main"/>
+    </p:ext>
+  </p:extLst>
 </p:presentation>
 </file>
 
@@ -254,7 +259,7 @@
           <a:p>
             <a:fld id="{6FF7E56C-39DC-4751-8E2C-49FE9F7E139F}" type="datetimeFigureOut">
               <a:rPr lang="en-US" smtClean="0"/>
-              <a:t>1/18/2023</a:t>
+              <a:t>1/20/2023</a:t>
             </a:fld>
             <a:endParaRPr lang="en-US"/>
           </a:p>
@@ -308,7 +313,7 @@
           <a:p>
             <a:fld id="{82A115B5-382A-4D56-84F6-C9D624AA0B1B}" type="slidenum">
               <a:rPr lang="en-US" smtClean="0"/>
-              <a:t>‹#›</a:t>
+              <a:t>‹Nr.›</a:t>
             </a:fld>
             <a:endParaRPr lang="en-US"/>
           </a:p>
@@ -452,7 +457,7 @@
           <a:p>
             <a:fld id="{6FF7E56C-39DC-4751-8E2C-49FE9F7E139F}" type="datetimeFigureOut">
               <a:rPr lang="en-US" smtClean="0"/>
-              <a:t>1/18/2023</a:t>
+              <a:t>1/20/2023</a:t>
             </a:fld>
             <a:endParaRPr lang="en-US"/>
           </a:p>
@@ -506,7 +511,7 @@
           <a:p>
             <a:fld id="{82A115B5-382A-4D56-84F6-C9D624AA0B1B}" type="slidenum">
               <a:rPr lang="en-US" smtClean="0"/>
-              <a:t>‹#›</a:t>
+              <a:t>‹Nr.›</a:t>
             </a:fld>
             <a:endParaRPr lang="en-US"/>
           </a:p>
@@ -660,7 +665,7 @@
           <a:p>
             <a:fld id="{6FF7E56C-39DC-4751-8E2C-49FE9F7E139F}" type="datetimeFigureOut">
               <a:rPr lang="en-US" smtClean="0"/>
-              <a:t>1/18/2023</a:t>
+              <a:t>1/20/2023</a:t>
             </a:fld>
             <a:endParaRPr lang="en-US"/>
           </a:p>
@@ -714,7 +719,7 @@
           <a:p>
             <a:fld id="{82A115B5-382A-4D56-84F6-C9D624AA0B1B}" type="slidenum">
               <a:rPr lang="en-US" smtClean="0"/>
-              <a:t>‹#›</a:t>
+              <a:t>‹Nr.›</a:t>
             </a:fld>
             <a:endParaRPr lang="en-US"/>
           </a:p>
@@ -858,7 +863,7 @@
           <a:p>
             <a:fld id="{6FF7E56C-39DC-4751-8E2C-49FE9F7E139F}" type="datetimeFigureOut">
               <a:rPr lang="en-US" smtClean="0"/>
-              <a:t>1/18/2023</a:t>
+              <a:t>1/20/2023</a:t>
             </a:fld>
             <a:endParaRPr lang="en-US"/>
           </a:p>
@@ -912,7 +917,7 @@
           <a:p>
             <a:fld id="{82A115B5-382A-4D56-84F6-C9D624AA0B1B}" type="slidenum">
               <a:rPr lang="en-US" smtClean="0"/>
-              <a:t>‹#›</a:t>
+              <a:t>‹Nr.›</a:t>
             </a:fld>
             <a:endParaRPr lang="en-US"/>
           </a:p>
@@ -1133,7 +1138,7 @@
           <a:p>
             <a:fld id="{6FF7E56C-39DC-4751-8E2C-49FE9F7E139F}" type="datetimeFigureOut">
               <a:rPr lang="en-US" smtClean="0"/>
-              <a:t>1/18/2023</a:t>
+              <a:t>1/20/2023</a:t>
             </a:fld>
             <a:endParaRPr lang="en-US"/>
           </a:p>
@@ -1187,7 +1192,7 @@
           <a:p>
             <a:fld id="{82A115B5-382A-4D56-84F6-C9D624AA0B1B}" type="slidenum">
               <a:rPr lang="en-US" smtClean="0"/>
-              <a:t>‹#›</a:t>
+              <a:t>‹Nr.›</a:t>
             </a:fld>
             <a:endParaRPr lang="en-US"/>
           </a:p>
@@ -1398,7 +1403,7 @@
           <a:p>
             <a:fld id="{6FF7E56C-39DC-4751-8E2C-49FE9F7E139F}" type="datetimeFigureOut">
               <a:rPr lang="en-US" smtClean="0"/>
-              <a:t>1/18/2023</a:t>
+              <a:t>1/20/2023</a:t>
             </a:fld>
             <a:endParaRPr lang="en-US"/>
           </a:p>
@@ -1452,7 +1457,7 @@
           <a:p>
             <a:fld id="{82A115B5-382A-4D56-84F6-C9D624AA0B1B}" type="slidenum">
               <a:rPr lang="en-US" smtClean="0"/>
-              <a:t>‹#›</a:t>
+              <a:t>‹Nr.›</a:t>
             </a:fld>
             <a:endParaRPr lang="en-US"/>
           </a:p>
@@ -1810,7 +1815,7 @@
           <a:p>
             <a:fld id="{6FF7E56C-39DC-4751-8E2C-49FE9F7E139F}" type="datetimeFigureOut">
               <a:rPr lang="en-US" smtClean="0"/>
-              <a:t>1/18/2023</a:t>
+              <a:t>1/20/2023</a:t>
             </a:fld>
             <a:endParaRPr lang="en-US"/>
           </a:p>
@@ -1864,7 +1869,7 @@
           <a:p>
             <a:fld id="{82A115B5-382A-4D56-84F6-C9D624AA0B1B}" type="slidenum">
               <a:rPr lang="en-US" smtClean="0"/>
-              <a:t>‹#›</a:t>
+              <a:t>‹Nr.›</a:t>
             </a:fld>
             <a:endParaRPr lang="en-US"/>
           </a:p>
@@ -1951,7 +1956,7 @@
           <a:p>
             <a:fld id="{6FF7E56C-39DC-4751-8E2C-49FE9F7E139F}" type="datetimeFigureOut">
               <a:rPr lang="en-US" smtClean="0"/>
-              <a:t>1/18/2023</a:t>
+              <a:t>1/20/2023</a:t>
             </a:fld>
             <a:endParaRPr lang="en-US"/>
           </a:p>
@@ -2005,7 +2010,7 @@
           <a:p>
             <a:fld id="{82A115B5-382A-4D56-84F6-C9D624AA0B1B}" type="slidenum">
               <a:rPr lang="en-US" smtClean="0"/>
-              <a:t>‹#›</a:t>
+              <a:t>‹Nr.›</a:t>
             </a:fld>
             <a:endParaRPr lang="en-US"/>
           </a:p>
@@ -2064,7 +2069,7 @@
           <a:p>
             <a:fld id="{6FF7E56C-39DC-4751-8E2C-49FE9F7E139F}" type="datetimeFigureOut">
               <a:rPr lang="en-US" smtClean="0"/>
-              <a:t>1/18/2023</a:t>
+              <a:t>1/20/2023</a:t>
             </a:fld>
             <a:endParaRPr lang="en-US"/>
           </a:p>
@@ -2118,7 +2123,7 @@
           <a:p>
             <a:fld id="{82A115B5-382A-4D56-84F6-C9D624AA0B1B}" type="slidenum">
               <a:rPr lang="en-US" smtClean="0"/>
-              <a:t>‹#›</a:t>
+              <a:t>‹Nr.›</a:t>
             </a:fld>
             <a:endParaRPr lang="en-US"/>
           </a:p>
@@ -2375,7 +2380,7 @@
           <a:p>
             <a:fld id="{6FF7E56C-39DC-4751-8E2C-49FE9F7E139F}" type="datetimeFigureOut">
               <a:rPr lang="en-US" smtClean="0"/>
-              <a:t>1/18/2023</a:t>
+              <a:t>1/20/2023</a:t>
             </a:fld>
             <a:endParaRPr lang="en-US"/>
           </a:p>
@@ -2429,7 +2434,7 @@
           <a:p>
             <a:fld id="{82A115B5-382A-4D56-84F6-C9D624AA0B1B}" type="slidenum">
               <a:rPr lang="en-US" smtClean="0"/>
-              <a:t>‹#›</a:t>
+              <a:t>‹Nr.›</a:t>
             </a:fld>
             <a:endParaRPr lang="en-US"/>
           </a:p>
@@ -2663,7 +2668,7 @@
           <a:p>
             <a:fld id="{6FF7E56C-39DC-4751-8E2C-49FE9F7E139F}" type="datetimeFigureOut">
               <a:rPr lang="en-US" smtClean="0"/>
-              <a:t>1/18/2023</a:t>
+              <a:t>1/20/2023</a:t>
             </a:fld>
             <a:endParaRPr lang="en-US"/>
           </a:p>
@@ -2717,7 +2722,7 @@
           <a:p>
             <a:fld id="{82A115B5-382A-4D56-84F6-C9D624AA0B1B}" type="slidenum">
               <a:rPr lang="en-US" smtClean="0"/>
-              <a:t>‹#›</a:t>
+              <a:t>‹Nr.›</a:t>
             </a:fld>
             <a:endParaRPr lang="en-US"/>
           </a:p>
@@ -2904,7 +2909,7 @@
           <a:p>
             <a:fld id="{6FF7E56C-39DC-4751-8E2C-49FE9F7E139F}" type="datetimeFigureOut">
               <a:rPr lang="en-US" smtClean="0"/>
-              <a:t>1/18/2023</a:t>
+              <a:t>1/20/2023</a:t>
             </a:fld>
             <a:endParaRPr lang="en-US"/>
           </a:p>
@@ -2994,7 +2999,7 @@
           <a:p>
             <a:fld id="{82A115B5-382A-4D56-84F6-C9D624AA0B1B}" type="slidenum">
               <a:rPr lang="en-US" smtClean="0"/>
-              <a:t>‹#›</a:t>
+              <a:t>‹Nr.›</a:t>
             </a:fld>
             <a:endParaRPr lang="en-US"/>
           </a:p>
@@ -3321,447 +3326,322 @@
           <a:chExt cx="0" cy="0"/>
         </a:xfrm>
       </p:grpSpPr>
-      <p:sp>
-        <p:nvSpPr>
-          <p:cNvPr id="10" name="Freeform: Shape 9">
-            <a:extLst>
-              <a:ext uri="{FF2B5EF4-FFF2-40B4-BE49-F238E27FC236}">
-                <a16:creationId xmlns:a16="http://schemas.microsoft.com/office/drawing/2014/main" id="{4C8A6ABE-9B9E-A5C9-3195-92CEDC058511}"/>
-              </a:ext>
-            </a:extLst>
-          </p:cNvPr>
-          <p:cNvSpPr/>
-          <p:nvPr/>
-        </p:nvSpPr>
-        <p:spPr>
-          <a:xfrm>
-            <a:off x="2149947" y="5069234"/>
-            <a:ext cx="863030" cy="554805"/>
-          </a:xfrm>
-          <a:custGeom>
-            <a:avLst/>
-            <a:gdLst>
-              <a:gd name="connsiteX0" fmla="*/ 0 w 863030"/>
-              <a:gd name="connsiteY0" fmla="*/ 549668 h 554805"/>
-              <a:gd name="connsiteX1" fmla="*/ 71920 w 863030"/>
-              <a:gd name="connsiteY1" fmla="*/ 0 h 554805"/>
-              <a:gd name="connsiteX2" fmla="*/ 863030 w 863030"/>
-              <a:gd name="connsiteY2" fmla="*/ 66782 h 554805"/>
-              <a:gd name="connsiteX3" fmla="*/ 842481 w 863030"/>
-              <a:gd name="connsiteY3" fmla="*/ 554805 h 554805"/>
-              <a:gd name="connsiteX4" fmla="*/ 0 w 863030"/>
-              <a:gd name="connsiteY4" fmla="*/ 549668 h 554805"/>
-            </a:gdLst>
-            <a:ahLst/>
-            <a:cxnLst>
-              <a:cxn ang="0">
-                <a:pos x="connsiteX0" y="connsiteY0"/>
-              </a:cxn>
-              <a:cxn ang="0">
-                <a:pos x="connsiteX1" y="connsiteY1"/>
-              </a:cxn>
-              <a:cxn ang="0">
-                <a:pos x="connsiteX2" y="connsiteY2"/>
-              </a:cxn>
-              <a:cxn ang="0">
-                <a:pos x="connsiteX3" y="connsiteY3"/>
-              </a:cxn>
-              <a:cxn ang="0">
-                <a:pos x="connsiteX4" y="connsiteY4"/>
-              </a:cxn>
-            </a:cxnLst>
-            <a:rect l="l" t="t" r="r" b="b"/>
-            <a:pathLst>
-              <a:path w="863030" h="554805">
-                <a:moveTo>
-                  <a:pt x="0" y="549668"/>
-                </a:moveTo>
-                <a:lnTo>
-                  <a:pt x="71920" y="0"/>
-                </a:lnTo>
-                <a:lnTo>
-                  <a:pt x="863030" y="66782"/>
-                </a:lnTo>
-                <a:lnTo>
-                  <a:pt x="842481" y="554805"/>
-                </a:lnTo>
-                <a:lnTo>
-                  <a:pt x="0" y="549668"/>
-                </a:lnTo>
-                <a:close/>
-              </a:path>
-            </a:pathLst>
-          </a:custGeom>
-          <a:solidFill>
-            <a:srgbClr val="FF8080"/>
-          </a:solidFill>
-          <a:ln>
-            <a:solidFill>
-              <a:schemeClr val="tx1"/>
-            </a:solidFill>
-          </a:ln>
-        </p:spPr>
-        <p:style>
-          <a:lnRef idx="2">
-            <a:schemeClr val="accent1">
-              <a:shade val="50000"/>
-            </a:schemeClr>
-          </a:lnRef>
-          <a:fillRef idx="1">
-            <a:schemeClr val="accent1"/>
-          </a:fillRef>
-          <a:effectRef idx="0">
-            <a:schemeClr val="accent1"/>
-          </a:effectRef>
-          <a:fontRef idx="minor">
-            <a:schemeClr val="lt1"/>
-          </a:fontRef>
-        </p:style>
-        <p:txBody>
-          <a:bodyPr rtlCol="0" anchor="ctr"/>
-          <a:lstStyle/>
-          <a:p>
-            <a:pPr algn="ctr"/>
-            <a:endParaRPr lang="en-US"/>
-          </a:p>
-        </p:txBody>
-      </p:sp>
-      <p:sp>
-        <p:nvSpPr>
-          <p:cNvPr id="8" name="Rectangle 7">
-            <a:extLst>
-              <a:ext uri="{FF2B5EF4-FFF2-40B4-BE49-F238E27FC236}">
-                <a16:creationId xmlns:a16="http://schemas.microsoft.com/office/drawing/2014/main" id="{57760920-618F-26C7-7B63-103BF6C96116}"/>
-              </a:ext>
-            </a:extLst>
-          </p:cNvPr>
-          <p:cNvSpPr/>
-          <p:nvPr/>
-        </p:nvSpPr>
-        <p:spPr>
-          <a:xfrm>
-            <a:off x="131075" y="5531571"/>
-            <a:ext cx="5208998" cy="683232"/>
-          </a:xfrm>
-          <a:prstGeom prst="rect">
-            <a:avLst/>
-          </a:prstGeom>
-          <a:solidFill>
-            <a:srgbClr val="E6E6FF"/>
-          </a:solidFill>
-          <a:ln w="19050">
-            <a:solidFill>
-              <a:srgbClr val="A5BCD8"/>
-            </a:solidFill>
-          </a:ln>
-        </p:spPr>
-        <p:style>
-          <a:lnRef idx="2">
-            <a:schemeClr val="accent1">
-              <a:shade val="50000"/>
-            </a:schemeClr>
-          </a:lnRef>
-          <a:fillRef idx="1">
-            <a:schemeClr val="accent1"/>
-          </a:fillRef>
-          <a:effectRef idx="0">
-            <a:schemeClr val="accent1"/>
-          </a:effectRef>
-          <a:fontRef idx="minor">
-            <a:schemeClr val="lt1"/>
-          </a:fontRef>
-        </p:style>
-        <p:txBody>
-          <a:bodyPr rtlCol="0" anchor="ctr"/>
-          <a:lstStyle/>
-          <a:p>
-            <a:pPr algn="ctr"/>
-            <a:endParaRPr lang="en-US"/>
-          </a:p>
-        </p:txBody>
-      </p:sp>
-      <p:sp>
-        <p:nvSpPr>
-          <p:cNvPr id="7" name="Block Arc 6">
-            <a:extLst>
-              <a:ext uri="{FF2B5EF4-FFF2-40B4-BE49-F238E27FC236}">
-                <a16:creationId xmlns:a16="http://schemas.microsoft.com/office/drawing/2014/main" id="{EBF3275A-4E00-28E5-8375-6F69463049AD}"/>
-              </a:ext>
-            </a:extLst>
-          </p:cNvPr>
-          <p:cNvSpPr/>
-          <p:nvPr/>
-        </p:nvSpPr>
-        <p:spPr>
-          <a:xfrm rot="10800000">
-            <a:off x="-500787" y="-114079"/>
-            <a:ext cx="6847727" cy="5337423"/>
-          </a:xfrm>
-          <a:prstGeom prst="blockArc">
-            <a:avLst>
-              <a:gd name="adj1" fmla="val 12865127"/>
-              <a:gd name="adj2" fmla="val 19501939"/>
-              <a:gd name="adj3" fmla="val 11947"/>
-            </a:avLst>
-          </a:prstGeom>
-          <a:solidFill>
-            <a:srgbClr val="99CC66"/>
-          </a:solidFill>
-        </p:spPr>
-        <p:style>
-          <a:lnRef idx="2">
-            <a:schemeClr val="accent1">
-              <a:shade val="50000"/>
-            </a:schemeClr>
-          </a:lnRef>
-          <a:fillRef idx="1">
-            <a:schemeClr val="accent1"/>
-          </a:fillRef>
-          <a:effectRef idx="0">
-            <a:schemeClr val="accent1"/>
-          </a:effectRef>
-          <a:fontRef idx="minor">
-            <a:schemeClr val="lt1"/>
-          </a:fontRef>
-        </p:style>
-        <p:txBody>
-          <a:bodyPr rtlCol="0" anchor="ctr"/>
-          <a:lstStyle/>
-          <a:p>
-            <a:pPr algn="ctr"/>
-            <a:endParaRPr lang="en-US">
-              <a:solidFill>
-                <a:schemeClr val="tx1"/>
-              </a:solidFill>
-            </a:endParaRPr>
-          </a:p>
-        </p:txBody>
-      </p:sp>
-      <p:sp>
-        <p:nvSpPr>
-          <p:cNvPr id="6" name="Arc 5">
-            <a:extLst>
-              <a:ext uri="{FF2B5EF4-FFF2-40B4-BE49-F238E27FC236}">
-                <a16:creationId xmlns:a16="http://schemas.microsoft.com/office/drawing/2014/main" id="{CE20CF3B-8D11-73F9-4AAF-59C625373784}"/>
-              </a:ext>
-            </a:extLst>
-          </p:cNvPr>
-          <p:cNvSpPr/>
-          <p:nvPr/>
-        </p:nvSpPr>
-        <p:spPr>
-          <a:xfrm rot="10800000">
-            <a:off x="151624" y="1231833"/>
-            <a:ext cx="5506948" cy="3724383"/>
-          </a:xfrm>
-          <a:prstGeom prst="arc">
-            <a:avLst>
-              <a:gd name="adj1" fmla="val 12005298"/>
-              <a:gd name="adj2" fmla="val 13757177"/>
-            </a:avLst>
-          </a:prstGeom>
-          <a:ln w="28575">
-            <a:prstDash val="sysDash"/>
-          </a:ln>
-        </p:spPr>
-        <p:style>
-          <a:lnRef idx="1">
-            <a:schemeClr val="accent1"/>
-          </a:lnRef>
-          <a:fillRef idx="0">
-            <a:schemeClr val="accent1"/>
-          </a:fillRef>
-          <a:effectRef idx="0">
-            <a:schemeClr val="accent1"/>
-          </a:effectRef>
-          <a:fontRef idx="minor">
-            <a:schemeClr val="tx1"/>
-          </a:fontRef>
-        </p:style>
-        <p:txBody>
-          <a:bodyPr rtlCol="0" anchor="ctr"/>
-          <a:lstStyle/>
-          <a:p>
-            <a:pPr algn="ctr"/>
-            <a:endParaRPr lang="en-US" sz="3600">
-              <a:solidFill>
-                <a:srgbClr val="FF0000"/>
-              </a:solidFill>
-            </a:endParaRPr>
-          </a:p>
-        </p:txBody>
-      </p:sp>
-      <p:cxnSp>
-        <p:nvCxnSpPr>
-          <p:cNvPr id="12" name="Straight Connector 11">
-            <a:extLst>
-              <a:ext uri="{FF2B5EF4-FFF2-40B4-BE49-F238E27FC236}">
-                <a16:creationId xmlns:a16="http://schemas.microsoft.com/office/drawing/2014/main" id="{BD3EE037-9360-7142-A540-5D99F38EB0EF}"/>
-              </a:ext>
-            </a:extLst>
-          </p:cNvPr>
-          <p:cNvCxnSpPr>
-            <a:cxnSpLocks/>
-          </p:cNvCxnSpPr>
-          <p:nvPr/>
-        </p:nvCxnSpPr>
-        <p:spPr>
-          <a:xfrm flipH="1">
-            <a:off x="-28816" y="5873187"/>
-            <a:ext cx="3302791" cy="0"/>
-          </a:xfrm>
-          <a:prstGeom prst="line">
-            <a:avLst/>
-          </a:prstGeom>
-          <a:ln w="19050">
-            <a:prstDash val="dash"/>
-          </a:ln>
-        </p:spPr>
-        <p:style>
-          <a:lnRef idx="1">
-            <a:schemeClr val="accent1"/>
-          </a:lnRef>
-          <a:fillRef idx="0">
-            <a:schemeClr val="accent1"/>
-          </a:fillRef>
-          <a:effectRef idx="0">
-            <a:schemeClr val="accent1"/>
-          </a:effectRef>
-          <a:fontRef idx="minor">
-            <a:schemeClr val="tx1"/>
-          </a:fontRef>
-        </p:style>
-      </p:cxnSp>
-      <p:cxnSp>
-        <p:nvCxnSpPr>
-          <p:cNvPr id="15" name="Straight Arrow Connector 14">
-            <a:extLst>
-              <a:ext uri="{FF2B5EF4-FFF2-40B4-BE49-F238E27FC236}">
-                <a16:creationId xmlns:a16="http://schemas.microsoft.com/office/drawing/2014/main" id="{70FA2FB7-8C62-2676-E7A1-0A1D6DC33A14}"/>
-              </a:ext>
-              <a:ext uri="{C183D7F6-B498-43B3-948B-1728B52AA6E4}">
-                <adec:decorative xmlns:adec="http://schemas.microsoft.com/office/drawing/2017/decorative" val="1"/>
-              </a:ext>
-            </a:extLst>
-          </p:cNvPr>
-          <p:cNvCxnSpPr/>
-          <p:nvPr/>
-        </p:nvCxnSpPr>
-        <p:spPr>
-          <a:xfrm flipH="1" flipV="1">
-            <a:off x="3557754" y="4535214"/>
-            <a:ext cx="157656" cy="599090"/>
-          </a:xfrm>
-          <a:prstGeom prst="straightConnector1">
-            <a:avLst/>
-          </a:prstGeom>
-          <a:ln w="12700">
-            <a:solidFill>
-              <a:schemeClr val="tx1"/>
-            </a:solidFill>
-            <a:headEnd type="triangle" w="lg" len="med"/>
-            <a:tailEnd type="triangle" w="lg" len="med"/>
-          </a:ln>
-        </p:spPr>
-        <p:style>
-          <a:lnRef idx="1">
-            <a:schemeClr val="accent1"/>
-          </a:lnRef>
-          <a:fillRef idx="0">
-            <a:schemeClr val="accent1"/>
-          </a:fillRef>
-          <a:effectRef idx="0">
-            <a:schemeClr val="accent1"/>
-          </a:effectRef>
-          <a:fontRef idx="minor">
-            <a:schemeClr val="tx1"/>
-          </a:fontRef>
-        </p:style>
-      </p:cxnSp>
-      <p:sp>
-        <p:nvSpPr>
-          <p:cNvPr id="16" name="TextBox 15">
-            <a:extLst>
-              <a:ext uri="{FF2B5EF4-FFF2-40B4-BE49-F238E27FC236}">
-                <a16:creationId xmlns:a16="http://schemas.microsoft.com/office/drawing/2014/main" id="{B723A58B-692D-2BE1-C907-31E745DF9D31}"/>
-              </a:ext>
-            </a:extLst>
-          </p:cNvPr>
-          <p:cNvSpPr txBox="1"/>
-          <p:nvPr/>
-        </p:nvSpPr>
-        <p:spPr>
-          <a:xfrm rot="20742338">
-            <a:off x="3590817" y="4496377"/>
-            <a:ext cx="426720" cy="523220"/>
-          </a:xfrm>
-          <a:prstGeom prst="rect">
-            <a:avLst/>
-          </a:prstGeom>
-          <a:noFill/>
-        </p:spPr>
-        <p:txBody>
-          <a:bodyPr wrap="none" rtlCol="0">
-            <a:spAutoFit/>
-          </a:bodyPr>
-          <a:lstStyle/>
-          <a:p>
-            <a:r>
-              <a:rPr lang="en-US" sz="2800" dirty="0"/>
-              <a:t>t</a:t>
-            </a:r>
-            <a:r>
-              <a:rPr lang="en-US" sz="2800" baseline="-25000" dirty="0"/>
-              <a:t>1</a:t>
-            </a:r>
-          </a:p>
-        </p:txBody>
-      </p:sp>
       <p:grpSp>
         <p:nvGrpSpPr>
-          <p:cNvPr id="28" name="Group 27">
-            <a:extLst>
-              <a:ext uri="{FF2B5EF4-FFF2-40B4-BE49-F238E27FC236}">
-                <a16:creationId xmlns:a16="http://schemas.microsoft.com/office/drawing/2014/main" id="{80E22A9C-5E7E-A9AF-435E-5432C0500C45}"/>
-              </a:ext>
-            </a:extLst>
-          </p:cNvPr>
-          <p:cNvGrpSpPr/>
+          <p:cNvPr id="4" name="Gruppieren 3">
+            <a:extLst>
+              <a:ext uri="{FF2B5EF4-FFF2-40B4-BE49-F238E27FC236}">
+                <a16:creationId xmlns:a16="http://schemas.microsoft.com/office/drawing/2014/main" id="{9C3CC2A4-CD4E-74BA-9616-1F2F15BA0EAA}"/>
+              </a:ext>
+            </a:extLst>
+          </p:cNvPr>
+          <p:cNvGrpSpPr>
+            <a:grpSpLocks noChangeAspect="1"/>
+          </p:cNvGrpSpPr>
           <p:nvPr/>
         </p:nvGrpSpPr>
         <p:grpSpPr>
           <a:xfrm>
-            <a:off x="2917821" y="4878185"/>
-            <a:ext cx="166967" cy="963443"/>
-            <a:chOff x="1204632" y="5240796"/>
-            <a:chExt cx="166967" cy="963443"/>
+            <a:off x="-500787" y="-114079"/>
+            <a:ext cx="6847727" cy="6328882"/>
+            <a:chOff x="-500787" y="-114079"/>
+            <a:chExt cx="6847727" cy="6328882"/>
           </a:xfrm>
         </p:grpSpPr>
-        <p:cxnSp>
-          <p:nvCxnSpPr>
-            <p:cNvPr id="18" name="Straight Arrow Connector 17">
+        <p:sp>
+          <p:nvSpPr>
+            <p:cNvPr id="7" name="Block Arc 6">
               <a:extLst>
                 <a:ext uri="{FF2B5EF4-FFF2-40B4-BE49-F238E27FC236}">
-                  <a16:creationId xmlns:a16="http://schemas.microsoft.com/office/drawing/2014/main" id="{02A6F45B-76E3-BF03-9DE1-EBBE0921F48F}"/>
+                  <a16:creationId xmlns:a16="http://schemas.microsoft.com/office/drawing/2014/main" id="{EBF3275A-4E00-28E5-8375-6F69463049AD}"/>
                 </a:ext>
               </a:extLst>
             </p:cNvPr>
-            <p:cNvCxnSpPr/>
+            <p:cNvSpPr/>
+            <p:nvPr/>
+          </p:nvSpPr>
+          <p:spPr>
+            <a:xfrm rot="10800000">
+              <a:off x="-500787" y="-114079"/>
+              <a:ext cx="6847727" cy="5337423"/>
+            </a:xfrm>
+            <a:prstGeom prst="blockArc">
+              <a:avLst>
+                <a:gd name="adj1" fmla="val 12865127"/>
+                <a:gd name="adj2" fmla="val 19501939"/>
+                <a:gd name="adj3" fmla="val 11947"/>
+              </a:avLst>
+            </a:prstGeom>
+            <a:solidFill>
+              <a:srgbClr val="99CC66"/>
+            </a:solidFill>
+          </p:spPr>
+          <p:style>
+            <a:lnRef idx="2">
+              <a:schemeClr val="accent1">
+                <a:shade val="50000"/>
+              </a:schemeClr>
+            </a:lnRef>
+            <a:fillRef idx="1">
+              <a:schemeClr val="accent1"/>
+            </a:fillRef>
+            <a:effectRef idx="0">
+              <a:schemeClr val="accent1"/>
+            </a:effectRef>
+            <a:fontRef idx="minor">
+              <a:schemeClr val="lt1"/>
+            </a:fontRef>
+          </p:style>
+          <p:txBody>
+            <a:bodyPr rtlCol="0" anchor="ctr"/>
+            <a:lstStyle/>
+            <a:p>
+              <a:pPr algn="ctr"/>
+              <a:endParaRPr lang="en-US">
+                <a:solidFill>
+                  <a:schemeClr val="tx1"/>
+                </a:solidFill>
+              </a:endParaRPr>
+            </a:p>
+          </p:txBody>
+        </p:sp>
+        <p:sp>
+          <p:nvSpPr>
+            <p:cNvPr id="10" name="Freeform: Shape 9">
+              <a:extLst>
+                <a:ext uri="{FF2B5EF4-FFF2-40B4-BE49-F238E27FC236}">
+                  <a16:creationId xmlns:a16="http://schemas.microsoft.com/office/drawing/2014/main" id="{4C8A6ABE-9B9E-A5C9-3195-92CEDC058511}"/>
+                </a:ext>
+              </a:extLst>
+            </p:cNvPr>
+            <p:cNvSpPr/>
+            <p:nvPr/>
+          </p:nvSpPr>
+          <p:spPr>
+            <a:xfrm>
+              <a:off x="2149947" y="5069234"/>
+              <a:ext cx="863030" cy="554805"/>
+            </a:xfrm>
+            <a:custGeom>
+              <a:avLst/>
+              <a:gdLst>
+                <a:gd name="connsiteX0" fmla="*/ 0 w 863030"/>
+                <a:gd name="connsiteY0" fmla="*/ 549668 h 554805"/>
+                <a:gd name="connsiteX1" fmla="*/ 71920 w 863030"/>
+                <a:gd name="connsiteY1" fmla="*/ 0 h 554805"/>
+                <a:gd name="connsiteX2" fmla="*/ 863030 w 863030"/>
+                <a:gd name="connsiteY2" fmla="*/ 66782 h 554805"/>
+                <a:gd name="connsiteX3" fmla="*/ 842481 w 863030"/>
+                <a:gd name="connsiteY3" fmla="*/ 554805 h 554805"/>
+                <a:gd name="connsiteX4" fmla="*/ 0 w 863030"/>
+                <a:gd name="connsiteY4" fmla="*/ 549668 h 554805"/>
+              </a:gdLst>
+              <a:ahLst/>
+              <a:cxnLst>
+                <a:cxn ang="0">
+                  <a:pos x="connsiteX0" y="connsiteY0"/>
+                </a:cxn>
+                <a:cxn ang="0">
+                  <a:pos x="connsiteX1" y="connsiteY1"/>
+                </a:cxn>
+                <a:cxn ang="0">
+                  <a:pos x="connsiteX2" y="connsiteY2"/>
+                </a:cxn>
+                <a:cxn ang="0">
+                  <a:pos x="connsiteX3" y="connsiteY3"/>
+                </a:cxn>
+                <a:cxn ang="0">
+                  <a:pos x="connsiteX4" y="connsiteY4"/>
+                </a:cxn>
+              </a:cxnLst>
+              <a:rect l="l" t="t" r="r" b="b"/>
+              <a:pathLst>
+                <a:path w="863030" h="554805">
+                  <a:moveTo>
+                    <a:pt x="0" y="549668"/>
+                  </a:moveTo>
+                  <a:lnTo>
+                    <a:pt x="71920" y="0"/>
+                  </a:lnTo>
+                  <a:lnTo>
+                    <a:pt x="863030" y="66782"/>
+                  </a:lnTo>
+                  <a:lnTo>
+                    <a:pt x="842481" y="554805"/>
+                  </a:lnTo>
+                  <a:lnTo>
+                    <a:pt x="0" y="549668"/>
+                  </a:lnTo>
+                  <a:close/>
+                </a:path>
+              </a:pathLst>
+            </a:custGeom>
+            <a:solidFill>
+              <a:srgbClr val="FF8080"/>
+            </a:solidFill>
+            <a:ln>
+              <a:solidFill>
+                <a:schemeClr val="tx1"/>
+              </a:solidFill>
+            </a:ln>
+          </p:spPr>
+          <p:style>
+            <a:lnRef idx="2">
+              <a:schemeClr val="accent1">
+                <a:shade val="50000"/>
+              </a:schemeClr>
+            </a:lnRef>
+            <a:fillRef idx="1">
+              <a:schemeClr val="accent1"/>
+            </a:fillRef>
+            <a:effectRef idx="0">
+              <a:schemeClr val="accent1"/>
+            </a:effectRef>
+            <a:fontRef idx="minor">
+              <a:schemeClr val="lt1"/>
+            </a:fontRef>
+          </p:style>
+          <p:txBody>
+            <a:bodyPr rtlCol="0" anchor="ctr"/>
+            <a:lstStyle/>
+            <a:p>
+              <a:pPr algn="ctr"/>
+              <a:endParaRPr lang="en-US"/>
+            </a:p>
+          </p:txBody>
+        </p:sp>
+        <p:sp>
+          <p:nvSpPr>
+            <p:cNvPr id="8" name="Rectangle 7">
+              <a:extLst>
+                <a:ext uri="{FF2B5EF4-FFF2-40B4-BE49-F238E27FC236}">
+                  <a16:creationId xmlns:a16="http://schemas.microsoft.com/office/drawing/2014/main" id="{57760920-618F-26C7-7B63-103BF6C96116}"/>
+                </a:ext>
+              </a:extLst>
+            </p:cNvPr>
+            <p:cNvSpPr/>
+            <p:nvPr/>
+          </p:nvSpPr>
+          <p:spPr>
+            <a:xfrm>
+              <a:off x="131075" y="5531571"/>
+              <a:ext cx="5208998" cy="683232"/>
+            </a:xfrm>
+            <a:prstGeom prst="rect">
+              <a:avLst/>
+            </a:prstGeom>
+            <a:solidFill>
+              <a:srgbClr val="E6E6FF"/>
+            </a:solidFill>
+            <a:ln w="19050">
+              <a:solidFill>
+                <a:srgbClr val="A5BCD8"/>
+              </a:solidFill>
+            </a:ln>
+          </p:spPr>
+          <p:style>
+            <a:lnRef idx="2">
+              <a:schemeClr val="accent1">
+                <a:shade val="50000"/>
+              </a:schemeClr>
+            </a:lnRef>
+            <a:fillRef idx="1">
+              <a:schemeClr val="accent1"/>
+            </a:fillRef>
+            <a:effectRef idx="0">
+              <a:schemeClr val="accent1"/>
+            </a:effectRef>
+            <a:fontRef idx="minor">
+              <a:schemeClr val="lt1"/>
+            </a:fontRef>
+          </p:style>
+          <p:txBody>
+            <a:bodyPr rtlCol="0" anchor="ctr"/>
+            <a:lstStyle/>
+            <a:p>
+              <a:pPr algn="ctr"/>
+              <a:endParaRPr lang="en-US"/>
+            </a:p>
+          </p:txBody>
+        </p:sp>
+        <p:sp>
+          <p:nvSpPr>
+            <p:cNvPr id="6" name="Arc 5">
+              <a:extLst>
+                <a:ext uri="{FF2B5EF4-FFF2-40B4-BE49-F238E27FC236}">
+                  <a16:creationId xmlns:a16="http://schemas.microsoft.com/office/drawing/2014/main" id="{CE20CF3B-8D11-73F9-4AAF-59C625373784}"/>
+                </a:ext>
+              </a:extLst>
+            </p:cNvPr>
+            <p:cNvSpPr/>
+            <p:nvPr/>
+          </p:nvSpPr>
+          <p:spPr>
+            <a:xfrm rot="10800000">
+              <a:off x="151624" y="1231833"/>
+              <a:ext cx="5506948" cy="3724383"/>
+            </a:xfrm>
+            <a:prstGeom prst="arc">
+              <a:avLst>
+                <a:gd name="adj1" fmla="val 12005298"/>
+                <a:gd name="adj2" fmla="val 13757177"/>
+              </a:avLst>
+            </a:prstGeom>
+            <a:ln w="28575">
+              <a:prstDash val="sysDash"/>
+            </a:ln>
+          </p:spPr>
+          <p:style>
+            <a:lnRef idx="1">
+              <a:schemeClr val="accent1"/>
+            </a:lnRef>
+            <a:fillRef idx="0">
+              <a:schemeClr val="accent1"/>
+            </a:fillRef>
+            <a:effectRef idx="0">
+              <a:schemeClr val="accent1"/>
+            </a:effectRef>
+            <a:fontRef idx="minor">
+              <a:schemeClr val="tx1"/>
+            </a:fontRef>
+          </p:style>
+          <p:txBody>
+            <a:bodyPr rtlCol="0" anchor="ctr"/>
+            <a:lstStyle/>
+            <a:p>
+              <a:pPr algn="ctr"/>
+              <a:endParaRPr lang="en-US" sz="3600">
+                <a:solidFill>
+                  <a:srgbClr val="FF0000"/>
+                </a:solidFill>
+              </a:endParaRPr>
+            </a:p>
+          </p:txBody>
+        </p:sp>
+        <p:cxnSp>
+          <p:nvCxnSpPr>
+            <p:cNvPr id="12" name="Straight Connector 11">
+              <a:extLst>
+                <a:ext uri="{FF2B5EF4-FFF2-40B4-BE49-F238E27FC236}">
+                  <a16:creationId xmlns:a16="http://schemas.microsoft.com/office/drawing/2014/main" id="{BD3EE037-9360-7142-A540-5D99F38EB0EF}"/>
+                </a:ext>
+              </a:extLst>
+            </p:cNvPr>
+            <p:cNvCxnSpPr>
+              <a:cxnSpLocks/>
+            </p:cNvCxnSpPr>
             <p:nvPr/>
           </p:nvCxnSpPr>
           <p:spPr>
-            <a:xfrm flipV="1">
-              <a:off x="1294533" y="5896013"/>
-              <a:ext cx="0" cy="308226"/>
+            <a:xfrm flipH="1">
+              <a:off x="-28816" y="5873187"/>
+              <a:ext cx="3302791" cy="0"/>
             </a:xfrm>
-            <a:prstGeom prst="straightConnector1">
+            <a:prstGeom prst="line">
               <a:avLst/>
             </a:prstGeom>
             <a:ln w="19050">
-              <a:solidFill>
-                <a:schemeClr val="tx1"/>
-              </a:solidFill>
-              <a:tailEnd type="triangle" w="lg" len="med"/>
+              <a:prstDash val="dash"/>
             </a:ln>
           </p:spPr>
           <p:style>
@@ -3781,10 +3661,367 @@
         </p:cxnSp>
         <p:cxnSp>
           <p:nvCxnSpPr>
-            <p:cNvPr id="19" name="Straight Arrow Connector 18">
+            <p:cNvPr id="15" name="Straight Arrow Connector 14">
               <a:extLst>
                 <a:ext uri="{FF2B5EF4-FFF2-40B4-BE49-F238E27FC236}">
-                  <a16:creationId xmlns:a16="http://schemas.microsoft.com/office/drawing/2014/main" id="{4EEA164C-A68C-E185-11F8-FD427C66109A}"/>
+                  <a16:creationId xmlns:a16="http://schemas.microsoft.com/office/drawing/2014/main" id="{70FA2FB7-8C62-2676-E7A1-0A1D6DC33A14}"/>
+                </a:ext>
+                <a:ext uri="{C183D7F6-B498-43B3-948B-1728B52AA6E4}">
+                  <adec:decorative xmlns:adec="http://schemas.microsoft.com/office/drawing/2017/decorative" val="1"/>
+                </a:ext>
+              </a:extLst>
+            </p:cNvPr>
+            <p:cNvCxnSpPr/>
+            <p:nvPr/>
+          </p:nvCxnSpPr>
+          <p:spPr>
+            <a:xfrm flipH="1" flipV="1">
+              <a:off x="3557754" y="4535214"/>
+              <a:ext cx="157656" cy="599090"/>
+            </a:xfrm>
+            <a:prstGeom prst="straightConnector1">
+              <a:avLst/>
+            </a:prstGeom>
+            <a:ln w="12700">
+              <a:solidFill>
+                <a:schemeClr val="tx1"/>
+              </a:solidFill>
+              <a:headEnd type="triangle" w="lg" len="med"/>
+              <a:tailEnd type="triangle" w="lg" len="med"/>
+            </a:ln>
+          </p:spPr>
+          <p:style>
+            <a:lnRef idx="1">
+              <a:schemeClr val="accent1"/>
+            </a:lnRef>
+            <a:fillRef idx="0">
+              <a:schemeClr val="accent1"/>
+            </a:fillRef>
+            <a:effectRef idx="0">
+              <a:schemeClr val="accent1"/>
+            </a:effectRef>
+            <a:fontRef idx="minor">
+              <a:schemeClr val="tx1"/>
+            </a:fontRef>
+          </p:style>
+        </p:cxnSp>
+        <p:sp>
+          <p:nvSpPr>
+            <p:cNvPr id="16" name="TextBox 15">
+              <a:extLst>
+                <a:ext uri="{FF2B5EF4-FFF2-40B4-BE49-F238E27FC236}">
+                  <a16:creationId xmlns:a16="http://schemas.microsoft.com/office/drawing/2014/main" id="{B723A58B-692D-2BE1-C907-31E745DF9D31}"/>
+                </a:ext>
+              </a:extLst>
+            </p:cNvPr>
+            <p:cNvSpPr txBox="1"/>
+            <p:nvPr/>
+          </p:nvSpPr>
+          <p:spPr>
+            <a:xfrm rot="20742338">
+              <a:off x="3590817" y="4496377"/>
+              <a:ext cx="426720" cy="523220"/>
+            </a:xfrm>
+            <a:prstGeom prst="rect">
+              <a:avLst/>
+            </a:prstGeom>
+            <a:noFill/>
+          </p:spPr>
+          <p:txBody>
+            <a:bodyPr wrap="none" rtlCol="0">
+              <a:spAutoFit/>
+            </a:bodyPr>
+            <a:lstStyle/>
+            <a:p>
+              <a:r>
+                <a:rPr lang="en-US" sz="2800" dirty="0"/>
+                <a:t>t</a:t>
+              </a:r>
+              <a:r>
+                <a:rPr lang="en-US" sz="2800" baseline="-25000" dirty="0"/>
+                <a:t>1</a:t>
+              </a:r>
+            </a:p>
+          </p:txBody>
+        </p:sp>
+        <p:grpSp>
+          <p:nvGrpSpPr>
+            <p:cNvPr id="28" name="Group 27">
+              <a:extLst>
+                <a:ext uri="{FF2B5EF4-FFF2-40B4-BE49-F238E27FC236}">
+                  <a16:creationId xmlns:a16="http://schemas.microsoft.com/office/drawing/2014/main" id="{80E22A9C-5E7E-A9AF-435E-5432C0500C45}"/>
+                </a:ext>
+              </a:extLst>
+            </p:cNvPr>
+            <p:cNvGrpSpPr/>
+            <p:nvPr/>
+          </p:nvGrpSpPr>
+          <p:grpSpPr>
+            <a:xfrm>
+              <a:off x="2917821" y="4878185"/>
+              <a:ext cx="166967" cy="963443"/>
+              <a:chOff x="1204632" y="5240796"/>
+              <a:chExt cx="166967" cy="963443"/>
+            </a:xfrm>
+          </p:grpSpPr>
+          <p:cxnSp>
+            <p:nvCxnSpPr>
+              <p:cNvPr id="18" name="Straight Arrow Connector 17">
+                <a:extLst>
+                  <a:ext uri="{FF2B5EF4-FFF2-40B4-BE49-F238E27FC236}">
+                    <a16:creationId xmlns:a16="http://schemas.microsoft.com/office/drawing/2014/main" id="{02A6F45B-76E3-BF03-9DE1-EBBE0921F48F}"/>
+                  </a:ext>
+                </a:extLst>
+              </p:cNvPr>
+              <p:cNvCxnSpPr/>
+              <p:nvPr/>
+            </p:nvCxnSpPr>
+            <p:spPr>
+              <a:xfrm flipV="1">
+                <a:off x="1294533" y="5896013"/>
+                <a:ext cx="0" cy="308226"/>
+              </a:xfrm>
+              <a:prstGeom prst="straightConnector1">
+                <a:avLst/>
+              </a:prstGeom>
+              <a:ln w="19050">
+                <a:solidFill>
+                  <a:schemeClr val="tx1"/>
+                </a:solidFill>
+                <a:tailEnd type="triangle" w="lg" len="med"/>
+              </a:ln>
+            </p:spPr>
+            <p:style>
+              <a:lnRef idx="1">
+                <a:schemeClr val="accent1"/>
+              </a:lnRef>
+              <a:fillRef idx="0">
+                <a:schemeClr val="accent1"/>
+              </a:fillRef>
+              <a:effectRef idx="0">
+                <a:schemeClr val="accent1"/>
+              </a:effectRef>
+              <a:fontRef idx="minor">
+                <a:schemeClr val="tx1"/>
+              </a:fontRef>
+            </p:style>
+          </p:cxnSp>
+          <p:cxnSp>
+            <p:nvCxnSpPr>
+              <p:cNvPr id="19" name="Straight Arrow Connector 18">
+                <a:extLst>
+                  <a:ext uri="{FF2B5EF4-FFF2-40B4-BE49-F238E27FC236}">
+                    <a16:creationId xmlns:a16="http://schemas.microsoft.com/office/drawing/2014/main" id="{4EEA164C-A68C-E185-11F8-FD427C66109A}"/>
+                  </a:ext>
+                </a:extLst>
+              </p:cNvPr>
+              <p:cNvCxnSpPr>
+                <a:cxnSpLocks/>
+              </p:cNvCxnSpPr>
+              <p:nvPr/>
+            </p:nvCxnSpPr>
+            <p:spPr>
+              <a:xfrm>
+                <a:off x="1284026" y="5240796"/>
+                <a:ext cx="0" cy="355672"/>
+              </a:xfrm>
+              <a:prstGeom prst="straightConnector1">
+                <a:avLst/>
+              </a:prstGeom>
+              <a:ln w="19050">
+                <a:solidFill>
+                  <a:schemeClr val="tx1"/>
+                </a:solidFill>
+                <a:tailEnd type="triangle" w="lg" len="med"/>
+              </a:ln>
+            </p:spPr>
+            <p:style>
+              <a:lnRef idx="1">
+                <a:schemeClr val="accent1"/>
+              </a:lnRef>
+              <a:fillRef idx="0">
+                <a:schemeClr val="accent1"/>
+              </a:fillRef>
+              <a:effectRef idx="0">
+                <a:schemeClr val="accent1"/>
+              </a:effectRef>
+              <a:fontRef idx="minor">
+                <a:schemeClr val="tx1"/>
+              </a:fontRef>
+            </p:style>
+          </p:cxnSp>
+          <p:cxnSp>
+            <p:nvCxnSpPr>
+              <p:cNvPr id="24" name="Straight Connector 23">
+                <a:extLst>
+                  <a:ext uri="{FF2B5EF4-FFF2-40B4-BE49-F238E27FC236}">
+                    <a16:creationId xmlns:a16="http://schemas.microsoft.com/office/drawing/2014/main" id="{701380D5-87FA-18D6-C9E2-5BFBD12B6AF6}"/>
+                  </a:ext>
+                </a:extLst>
+              </p:cNvPr>
+              <p:cNvCxnSpPr/>
+              <p:nvPr/>
+            </p:nvCxnSpPr>
+            <p:spPr>
+              <a:xfrm>
+                <a:off x="1204632" y="5596468"/>
+                <a:ext cx="151202" cy="0"/>
+              </a:xfrm>
+              <a:prstGeom prst="line">
+                <a:avLst/>
+              </a:prstGeom>
+              <a:ln w="19050">
+                <a:solidFill>
+                  <a:schemeClr val="tx1"/>
+                </a:solidFill>
+                <a:tailEnd w="lg" len="med"/>
+              </a:ln>
+            </p:spPr>
+            <p:style>
+              <a:lnRef idx="1">
+                <a:schemeClr val="accent1"/>
+              </a:lnRef>
+              <a:fillRef idx="0">
+                <a:schemeClr val="accent1"/>
+              </a:fillRef>
+              <a:effectRef idx="0">
+                <a:schemeClr val="accent1"/>
+              </a:effectRef>
+              <a:fontRef idx="minor">
+                <a:schemeClr val="tx1"/>
+              </a:fontRef>
+            </p:style>
+          </p:cxnSp>
+          <p:cxnSp>
+            <p:nvCxnSpPr>
+              <p:cNvPr id="25" name="Straight Connector 24">
+                <a:extLst>
+                  <a:ext uri="{FF2B5EF4-FFF2-40B4-BE49-F238E27FC236}">
+                    <a16:creationId xmlns:a16="http://schemas.microsoft.com/office/drawing/2014/main" id="{E1DED060-AA97-3BC2-A954-C1B79EC8C6B0}"/>
+                  </a:ext>
+                </a:extLst>
+              </p:cNvPr>
+              <p:cNvCxnSpPr/>
+              <p:nvPr/>
+            </p:nvCxnSpPr>
+            <p:spPr>
+              <a:xfrm>
+                <a:off x="1220397" y="5885499"/>
+                <a:ext cx="151202" cy="0"/>
+              </a:xfrm>
+              <a:prstGeom prst="line">
+                <a:avLst/>
+              </a:prstGeom>
+              <a:ln w="19050">
+                <a:solidFill>
+                  <a:schemeClr val="tx1"/>
+                </a:solidFill>
+                <a:tailEnd w="lg" len="med"/>
+              </a:ln>
+            </p:spPr>
+            <p:style>
+              <a:lnRef idx="1">
+                <a:schemeClr val="accent1"/>
+              </a:lnRef>
+              <a:fillRef idx="0">
+                <a:schemeClr val="accent1"/>
+              </a:fillRef>
+              <a:effectRef idx="0">
+                <a:schemeClr val="accent1"/>
+              </a:effectRef>
+              <a:fontRef idx="minor">
+                <a:schemeClr val="tx1"/>
+              </a:fontRef>
+            </p:style>
+          </p:cxnSp>
+          <p:cxnSp>
+            <p:nvCxnSpPr>
+              <p:cNvPr id="27" name="Straight Connector 26">
+                <a:extLst>
+                  <a:ext uri="{FF2B5EF4-FFF2-40B4-BE49-F238E27FC236}">
+                    <a16:creationId xmlns:a16="http://schemas.microsoft.com/office/drawing/2014/main" id="{00FE8319-5ECD-03F7-C7DE-D3B157F56021}"/>
+                  </a:ext>
+                </a:extLst>
+              </p:cNvPr>
+              <p:cNvCxnSpPr/>
+              <p:nvPr/>
+            </p:nvCxnSpPr>
+            <p:spPr>
+              <a:xfrm flipH="1" flipV="1">
+                <a:off x="1280233" y="5309174"/>
+                <a:ext cx="14300" cy="895065"/>
+              </a:xfrm>
+              <a:prstGeom prst="line">
+                <a:avLst/>
+              </a:prstGeom>
+              <a:ln w="19050">
+                <a:solidFill>
+                  <a:schemeClr val="tx1"/>
+                </a:solidFill>
+                <a:tailEnd w="lg" len="med"/>
+              </a:ln>
+            </p:spPr>
+            <p:style>
+              <a:lnRef idx="1">
+                <a:schemeClr val="accent1"/>
+              </a:lnRef>
+              <a:fillRef idx="0">
+                <a:schemeClr val="accent1"/>
+              </a:fillRef>
+              <a:effectRef idx="0">
+                <a:schemeClr val="accent1"/>
+              </a:effectRef>
+              <a:fontRef idx="minor">
+                <a:schemeClr val="tx1"/>
+              </a:fontRef>
+            </p:style>
+          </p:cxnSp>
+        </p:grpSp>
+        <p:sp>
+          <p:nvSpPr>
+            <p:cNvPr id="29" name="TextBox 28">
+              <a:extLst>
+                <a:ext uri="{FF2B5EF4-FFF2-40B4-BE49-F238E27FC236}">
+                  <a16:creationId xmlns:a16="http://schemas.microsoft.com/office/drawing/2014/main" id="{AD50B506-0CCE-D957-05DB-53AD4001409B}"/>
+                </a:ext>
+              </a:extLst>
+            </p:cNvPr>
+            <p:cNvSpPr txBox="1"/>
+            <p:nvPr/>
+          </p:nvSpPr>
+          <p:spPr>
+            <a:xfrm rot="16200000">
+              <a:off x="2589919" y="5132253"/>
+              <a:ext cx="336952" cy="523220"/>
+            </a:xfrm>
+            <a:prstGeom prst="rect">
+              <a:avLst/>
+            </a:prstGeom>
+            <a:noFill/>
+          </p:spPr>
+          <p:txBody>
+            <a:bodyPr wrap="none" rtlCol="0">
+              <a:spAutoFit/>
+            </a:bodyPr>
+            <a:lstStyle/>
+            <a:p>
+              <a:r>
+                <a:rPr lang="en-US" sz="2800" dirty="0"/>
+                <a:t>c</a:t>
+              </a:r>
+              <a:endParaRPr lang="en-US" sz="2800" baseline="-25000" dirty="0"/>
+            </a:p>
+          </p:txBody>
+        </p:sp>
+        <p:cxnSp>
+          <p:nvCxnSpPr>
+            <p:cNvPr id="30" name="Straight Arrow Connector 29">
+              <a:extLst>
+                <a:ext uri="{FF2B5EF4-FFF2-40B4-BE49-F238E27FC236}">
+                  <a16:creationId xmlns:a16="http://schemas.microsoft.com/office/drawing/2014/main" id="{BA8C3651-B6BA-F65D-BBB7-E373D0447BFF}"/>
+                </a:ext>
+                <a:ext uri="{C183D7F6-B498-43B3-948B-1728B52AA6E4}">
+                  <adec:decorative xmlns:adec="http://schemas.microsoft.com/office/drawing/2017/decorative" val="1"/>
                 </a:ext>
               </a:extLst>
             </p:cNvPr>
@@ -3794,18 +4031,518 @@
             <p:nvPr/>
           </p:nvCxnSpPr>
           <p:spPr>
-            <a:xfrm>
-              <a:off x="1284026" y="5240796"/>
-              <a:ext cx="0" cy="355672"/>
+            <a:xfrm rot="922805" flipH="1" flipV="1">
+              <a:off x="3520967" y="5575739"/>
+              <a:ext cx="157656" cy="599090"/>
             </a:xfrm>
             <a:prstGeom prst="straightConnector1">
               <a:avLst/>
             </a:prstGeom>
-            <a:ln w="19050">
+            <a:ln w="12700">
               <a:solidFill>
                 <a:schemeClr val="tx1"/>
               </a:solidFill>
+              <a:headEnd type="triangle" w="lg" len="med"/>
               <a:tailEnd type="triangle" w="lg" len="med"/>
+            </a:ln>
+          </p:spPr>
+          <p:style>
+            <a:lnRef idx="1">
+              <a:schemeClr val="accent1"/>
+            </a:lnRef>
+            <a:fillRef idx="0">
+              <a:schemeClr val="accent1"/>
+            </a:fillRef>
+            <a:effectRef idx="0">
+              <a:schemeClr val="accent1"/>
+            </a:effectRef>
+            <a:fontRef idx="minor">
+              <a:schemeClr val="tx1"/>
+            </a:fontRef>
+          </p:style>
+        </p:cxnSp>
+        <p:sp>
+          <p:nvSpPr>
+            <p:cNvPr id="31" name="TextBox 30">
+              <a:extLst>
+                <a:ext uri="{FF2B5EF4-FFF2-40B4-BE49-F238E27FC236}">
+                  <a16:creationId xmlns:a16="http://schemas.microsoft.com/office/drawing/2014/main" id="{C100E522-A428-E860-9032-A02325A8645C}"/>
+                </a:ext>
+              </a:extLst>
+            </p:cNvPr>
+            <p:cNvSpPr txBox="1"/>
+            <p:nvPr/>
+          </p:nvSpPr>
+          <p:spPr>
+            <a:xfrm rot="65143">
+              <a:off x="3550023" y="5536902"/>
+              <a:ext cx="434734" cy="523220"/>
+            </a:xfrm>
+            <a:prstGeom prst="rect">
+              <a:avLst/>
+            </a:prstGeom>
+            <a:noFill/>
+          </p:spPr>
+          <p:txBody>
+            <a:bodyPr wrap="none" rtlCol="0">
+              <a:spAutoFit/>
+            </a:bodyPr>
+            <a:lstStyle/>
+            <a:p>
+              <a:r>
+                <a:rPr lang="en-US" sz="2800" dirty="0" err="1"/>
+                <a:t>t</a:t>
+              </a:r>
+              <a:r>
+                <a:rPr lang="en-US" sz="2800" baseline="-25000" dirty="0" err="1"/>
+                <a:t>B</a:t>
+              </a:r>
+              <a:endParaRPr lang="en-US" sz="2800" baseline="-25000" dirty="0"/>
+            </a:p>
+          </p:txBody>
+        </p:sp>
+        <p:sp>
+          <p:nvSpPr>
+            <p:cNvPr id="37" name="Arc 36">
+              <a:extLst>
+                <a:ext uri="{FF2B5EF4-FFF2-40B4-BE49-F238E27FC236}">
+                  <a16:creationId xmlns:a16="http://schemas.microsoft.com/office/drawing/2014/main" id="{C8B39850-39AE-F326-5494-104A49D62792}"/>
+                </a:ext>
+              </a:extLst>
+            </p:cNvPr>
+            <p:cNvSpPr/>
+            <p:nvPr/>
+          </p:nvSpPr>
+          <p:spPr>
+            <a:xfrm rot="10800000">
+              <a:off x="151623" y="1226578"/>
+              <a:ext cx="5506948" cy="3724383"/>
+            </a:xfrm>
+            <a:prstGeom prst="arc">
+              <a:avLst>
+                <a:gd name="adj1" fmla="val 16576986"/>
+                <a:gd name="adj2" fmla="val 20227163"/>
+              </a:avLst>
+            </a:prstGeom>
+            <a:ln w="28575">
+              <a:prstDash val="sysDash"/>
+            </a:ln>
+          </p:spPr>
+          <p:style>
+            <a:lnRef idx="1">
+              <a:schemeClr val="accent1"/>
+            </a:lnRef>
+            <a:fillRef idx="0">
+              <a:schemeClr val="accent1"/>
+            </a:fillRef>
+            <a:effectRef idx="0">
+              <a:schemeClr val="accent1"/>
+            </a:effectRef>
+            <a:fontRef idx="minor">
+              <a:schemeClr val="tx1"/>
+            </a:fontRef>
+          </p:style>
+          <p:txBody>
+            <a:bodyPr rtlCol="0" anchor="ctr"/>
+            <a:lstStyle/>
+            <a:p>
+              <a:pPr algn="ctr"/>
+              <a:endParaRPr lang="en-US" sz="3600">
+                <a:solidFill>
+                  <a:srgbClr val="FF0000"/>
+                </a:solidFill>
+              </a:endParaRPr>
+            </a:p>
+          </p:txBody>
+        </p:sp>
+        <p:cxnSp>
+          <p:nvCxnSpPr>
+            <p:cNvPr id="38" name="Straight Connector 37">
+              <a:extLst>
+                <a:ext uri="{FF2B5EF4-FFF2-40B4-BE49-F238E27FC236}">
+                  <a16:creationId xmlns:a16="http://schemas.microsoft.com/office/drawing/2014/main" id="{A7C2578E-45EF-170B-88B3-EFF228F31AC0}"/>
+                </a:ext>
+              </a:extLst>
+            </p:cNvPr>
+            <p:cNvCxnSpPr>
+              <a:cxnSpLocks/>
+            </p:cNvCxnSpPr>
+            <p:nvPr/>
+          </p:nvCxnSpPr>
+          <p:spPr>
+            <a:xfrm flipH="1">
+              <a:off x="4156844" y="5878445"/>
+              <a:ext cx="1337106" cy="0"/>
+            </a:xfrm>
+            <a:prstGeom prst="line">
+              <a:avLst/>
+            </a:prstGeom>
+            <a:ln w="19050">
+              <a:prstDash val="dash"/>
+            </a:ln>
+          </p:spPr>
+          <p:style>
+            <a:lnRef idx="1">
+              <a:schemeClr val="accent1"/>
+            </a:lnRef>
+            <a:fillRef idx="0">
+              <a:schemeClr val="accent1"/>
+            </a:fillRef>
+            <a:effectRef idx="0">
+              <a:schemeClr val="accent1"/>
+            </a:effectRef>
+            <a:fontRef idx="minor">
+              <a:schemeClr val="tx1"/>
+            </a:fontRef>
+          </p:style>
+        </p:cxnSp>
+      </p:grpSp>
+      <p:grpSp>
+        <p:nvGrpSpPr>
+          <p:cNvPr id="3" name="Gruppieren 2">
+            <a:extLst>
+              <a:ext uri="{FF2B5EF4-FFF2-40B4-BE49-F238E27FC236}">
+                <a16:creationId xmlns:a16="http://schemas.microsoft.com/office/drawing/2014/main" id="{F195C70B-4E0F-5C9B-EABB-BF67CF1C4A5F}"/>
+              </a:ext>
+            </a:extLst>
+          </p:cNvPr>
+          <p:cNvGrpSpPr>
+            <a:grpSpLocks noChangeAspect="1"/>
+          </p:cNvGrpSpPr>
+          <p:nvPr/>
+        </p:nvGrpSpPr>
+        <p:grpSpPr>
+          <a:xfrm>
+            <a:off x="5918527" y="-114034"/>
+            <a:ext cx="6847727" cy="6328882"/>
+            <a:chOff x="5918527" y="-114034"/>
+            <a:chExt cx="6847727" cy="6328882"/>
+          </a:xfrm>
+        </p:grpSpPr>
+        <p:sp>
+          <p:nvSpPr>
+            <p:cNvPr id="72" name="Freeform: Shape 71">
+              <a:extLst>
+                <a:ext uri="{FF2B5EF4-FFF2-40B4-BE49-F238E27FC236}">
+                  <a16:creationId xmlns:a16="http://schemas.microsoft.com/office/drawing/2014/main" id="{18D0BEDE-3BC5-EDCA-DF48-7F04809A3F0D}"/>
+                </a:ext>
+              </a:extLst>
+            </p:cNvPr>
+            <p:cNvSpPr/>
+            <p:nvPr/>
+          </p:nvSpPr>
+          <p:spPr>
+            <a:xfrm>
+              <a:off x="8569261" y="5069279"/>
+              <a:ext cx="863030" cy="554805"/>
+            </a:xfrm>
+            <a:custGeom>
+              <a:avLst/>
+              <a:gdLst>
+                <a:gd name="connsiteX0" fmla="*/ 0 w 863030"/>
+                <a:gd name="connsiteY0" fmla="*/ 549668 h 554805"/>
+                <a:gd name="connsiteX1" fmla="*/ 71920 w 863030"/>
+                <a:gd name="connsiteY1" fmla="*/ 0 h 554805"/>
+                <a:gd name="connsiteX2" fmla="*/ 863030 w 863030"/>
+                <a:gd name="connsiteY2" fmla="*/ 66782 h 554805"/>
+                <a:gd name="connsiteX3" fmla="*/ 842481 w 863030"/>
+                <a:gd name="connsiteY3" fmla="*/ 554805 h 554805"/>
+                <a:gd name="connsiteX4" fmla="*/ 0 w 863030"/>
+                <a:gd name="connsiteY4" fmla="*/ 549668 h 554805"/>
+              </a:gdLst>
+              <a:ahLst/>
+              <a:cxnLst>
+                <a:cxn ang="0">
+                  <a:pos x="connsiteX0" y="connsiteY0"/>
+                </a:cxn>
+                <a:cxn ang="0">
+                  <a:pos x="connsiteX1" y="connsiteY1"/>
+                </a:cxn>
+                <a:cxn ang="0">
+                  <a:pos x="connsiteX2" y="connsiteY2"/>
+                </a:cxn>
+                <a:cxn ang="0">
+                  <a:pos x="connsiteX3" y="connsiteY3"/>
+                </a:cxn>
+                <a:cxn ang="0">
+                  <a:pos x="connsiteX4" y="connsiteY4"/>
+                </a:cxn>
+              </a:cxnLst>
+              <a:rect l="l" t="t" r="r" b="b"/>
+              <a:pathLst>
+                <a:path w="863030" h="554805">
+                  <a:moveTo>
+                    <a:pt x="0" y="549668"/>
+                  </a:moveTo>
+                  <a:lnTo>
+                    <a:pt x="71920" y="0"/>
+                  </a:lnTo>
+                  <a:lnTo>
+                    <a:pt x="863030" y="66782"/>
+                  </a:lnTo>
+                  <a:lnTo>
+                    <a:pt x="842481" y="554805"/>
+                  </a:lnTo>
+                  <a:lnTo>
+                    <a:pt x="0" y="549668"/>
+                  </a:lnTo>
+                  <a:close/>
+                </a:path>
+              </a:pathLst>
+            </a:custGeom>
+            <a:solidFill>
+              <a:srgbClr val="FF8080"/>
+            </a:solidFill>
+            <a:ln>
+              <a:solidFill>
+                <a:schemeClr val="tx1"/>
+              </a:solidFill>
+            </a:ln>
+          </p:spPr>
+          <p:style>
+            <a:lnRef idx="2">
+              <a:schemeClr val="accent1">
+                <a:shade val="50000"/>
+              </a:schemeClr>
+            </a:lnRef>
+            <a:fillRef idx="1">
+              <a:schemeClr val="accent1"/>
+            </a:fillRef>
+            <a:effectRef idx="0">
+              <a:schemeClr val="accent1"/>
+            </a:effectRef>
+            <a:fontRef idx="minor">
+              <a:schemeClr val="lt1"/>
+            </a:fontRef>
+          </p:style>
+          <p:txBody>
+            <a:bodyPr rtlCol="0" anchor="ctr"/>
+            <a:lstStyle/>
+            <a:p>
+              <a:pPr algn="ctr"/>
+              <a:endParaRPr lang="en-US"/>
+            </a:p>
+          </p:txBody>
+        </p:sp>
+        <p:sp>
+          <p:nvSpPr>
+            <p:cNvPr id="73" name="Rectangle 72">
+              <a:extLst>
+                <a:ext uri="{FF2B5EF4-FFF2-40B4-BE49-F238E27FC236}">
+                  <a16:creationId xmlns:a16="http://schemas.microsoft.com/office/drawing/2014/main" id="{FAE70DDD-629A-2AB2-BBAF-71C9CE2D9DBC}"/>
+                </a:ext>
+              </a:extLst>
+            </p:cNvPr>
+            <p:cNvSpPr/>
+            <p:nvPr/>
+          </p:nvSpPr>
+          <p:spPr>
+            <a:xfrm>
+              <a:off x="6550389" y="5531616"/>
+              <a:ext cx="5208998" cy="683232"/>
+            </a:xfrm>
+            <a:prstGeom prst="rect">
+              <a:avLst/>
+            </a:prstGeom>
+            <a:solidFill>
+              <a:srgbClr val="E6E6FF"/>
+            </a:solidFill>
+            <a:ln w="19050">
+              <a:solidFill>
+                <a:srgbClr val="A5BCD8"/>
+              </a:solidFill>
+            </a:ln>
+          </p:spPr>
+          <p:style>
+            <a:lnRef idx="2">
+              <a:schemeClr val="accent1">
+                <a:shade val="50000"/>
+              </a:schemeClr>
+            </a:lnRef>
+            <a:fillRef idx="1">
+              <a:schemeClr val="accent1"/>
+            </a:fillRef>
+            <a:effectRef idx="0">
+              <a:schemeClr val="accent1"/>
+            </a:effectRef>
+            <a:fontRef idx="minor">
+              <a:schemeClr val="lt1"/>
+            </a:fontRef>
+          </p:style>
+          <p:txBody>
+            <a:bodyPr rtlCol="0" anchor="ctr"/>
+            <a:lstStyle/>
+            <a:p>
+              <a:pPr algn="ctr"/>
+              <a:endParaRPr lang="en-US"/>
+            </a:p>
+          </p:txBody>
+        </p:sp>
+        <p:sp>
+          <p:nvSpPr>
+            <p:cNvPr id="74" name="Block Arc 73">
+              <a:extLst>
+                <a:ext uri="{FF2B5EF4-FFF2-40B4-BE49-F238E27FC236}">
+                  <a16:creationId xmlns:a16="http://schemas.microsoft.com/office/drawing/2014/main" id="{9803AB9A-C6F7-47EC-9D57-6BFE330AE639}"/>
+                </a:ext>
+              </a:extLst>
+            </p:cNvPr>
+            <p:cNvSpPr/>
+            <p:nvPr/>
+          </p:nvSpPr>
+          <p:spPr>
+            <a:xfrm rot="10800000">
+              <a:off x="5918527" y="-114034"/>
+              <a:ext cx="6847727" cy="5337423"/>
+            </a:xfrm>
+            <a:prstGeom prst="blockArc">
+              <a:avLst>
+                <a:gd name="adj1" fmla="val 12865127"/>
+                <a:gd name="adj2" fmla="val 19501939"/>
+                <a:gd name="adj3" fmla="val 11947"/>
+              </a:avLst>
+            </a:prstGeom>
+            <a:solidFill>
+              <a:srgbClr val="99CC66"/>
+            </a:solidFill>
+          </p:spPr>
+          <p:style>
+            <a:lnRef idx="2">
+              <a:schemeClr val="accent1">
+                <a:shade val="50000"/>
+              </a:schemeClr>
+            </a:lnRef>
+            <a:fillRef idx="1">
+              <a:schemeClr val="accent1"/>
+            </a:fillRef>
+            <a:effectRef idx="0">
+              <a:schemeClr val="accent1"/>
+            </a:effectRef>
+            <a:fontRef idx="minor">
+              <a:schemeClr val="lt1"/>
+            </a:fontRef>
+          </p:style>
+          <p:txBody>
+            <a:bodyPr rtlCol="0" anchor="ctr"/>
+            <a:lstStyle/>
+            <a:p>
+              <a:pPr algn="ctr"/>
+              <a:endParaRPr lang="en-US">
+                <a:solidFill>
+                  <a:schemeClr val="tx1"/>
+                </a:solidFill>
+              </a:endParaRPr>
+            </a:p>
+          </p:txBody>
+        </p:sp>
+        <p:cxnSp>
+          <p:nvCxnSpPr>
+            <p:cNvPr id="86" name="Straight Arrow Connector 85">
+              <a:extLst>
+                <a:ext uri="{FF2B5EF4-FFF2-40B4-BE49-F238E27FC236}">
+                  <a16:creationId xmlns:a16="http://schemas.microsoft.com/office/drawing/2014/main" id="{EBEE6CF5-D55D-D491-2D90-DA2434D26E56}"/>
+                </a:ext>
+                <a:ext uri="{C183D7F6-B498-43B3-948B-1728B52AA6E4}">
+                  <adec:decorative xmlns:adec="http://schemas.microsoft.com/office/drawing/2017/decorative" val="1"/>
+                </a:ext>
+              </a:extLst>
+            </p:cNvPr>
+            <p:cNvCxnSpPr>
+              <a:cxnSpLocks/>
+            </p:cNvCxnSpPr>
+            <p:nvPr/>
+          </p:nvCxnSpPr>
+          <p:spPr>
+            <a:xfrm flipH="1">
+              <a:off x="8569261" y="5662993"/>
+              <a:ext cx="863030" cy="0"/>
+            </a:xfrm>
+            <a:prstGeom prst="straightConnector1">
+              <a:avLst/>
+            </a:prstGeom>
+            <a:ln w="12700">
+              <a:solidFill>
+                <a:schemeClr val="tx1"/>
+              </a:solidFill>
+              <a:headEnd type="triangle" w="lg" len="med"/>
+              <a:tailEnd type="triangle" w="lg" len="med"/>
+            </a:ln>
+          </p:spPr>
+          <p:style>
+            <a:lnRef idx="1">
+              <a:schemeClr val="accent1"/>
+            </a:lnRef>
+            <a:fillRef idx="0">
+              <a:schemeClr val="accent1"/>
+            </a:fillRef>
+            <a:effectRef idx="0">
+              <a:schemeClr val="accent1"/>
+            </a:effectRef>
+            <a:fontRef idx="minor">
+              <a:schemeClr val="tx1"/>
+            </a:fontRef>
+          </p:style>
+        </p:cxnSp>
+        <p:sp>
+          <p:nvSpPr>
+            <p:cNvPr id="87" name="TextBox 86">
+              <a:extLst>
+                <a:ext uri="{FF2B5EF4-FFF2-40B4-BE49-F238E27FC236}">
+                  <a16:creationId xmlns:a16="http://schemas.microsoft.com/office/drawing/2014/main" id="{75B7EEE4-43A4-AEB1-01D3-3E795FBE3B08}"/>
+                </a:ext>
+              </a:extLst>
+            </p:cNvPr>
+            <p:cNvSpPr txBox="1"/>
+            <p:nvPr/>
+          </p:nvSpPr>
+          <p:spPr>
+            <a:xfrm rot="65143">
+              <a:off x="8833143" y="5216379"/>
+              <a:ext cx="373820" cy="523220"/>
+            </a:xfrm>
+            <a:prstGeom prst="rect">
+              <a:avLst/>
+            </a:prstGeom>
+            <a:noFill/>
+          </p:spPr>
+          <p:txBody>
+            <a:bodyPr wrap="none" rtlCol="0">
+              <a:spAutoFit/>
+            </a:bodyPr>
+            <a:lstStyle/>
+            <a:p>
+              <a:r>
+                <a:rPr lang="en-US" sz="2800" dirty="0"/>
+                <a:t>b</a:t>
+              </a:r>
+              <a:endParaRPr lang="en-US" sz="2800" baseline="-25000" dirty="0"/>
+            </a:p>
+          </p:txBody>
+        </p:sp>
+        <p:cxnSp>
+          <p:nvCxnSpPr>
+            <p:cNvPr id="93" name="Straight Connector 92">
+              <a:extLst>
+                <a:ext uri="{FF2B5EF4-FFF2-40B4-BE49-F238E27FC236}">
+                  <a16:creationId xmlns:a16="http://schemas.microsoft.com/office/drawing/2014/main" id="{A67BE271-10EE-64DE-F1A6-D2DF281BECCE}"/>
+                </a:ext>
+              </a:extLst>
+            </p:cNvPr>
+            <p:cNvCxnSpPr/>
+            <p:nvPr/>
+          </p:nvCxnSpPr>
+          <p:spPr>
+            <a:xfrm flipV="1">
+              <a:off x="8569261" y="5581735"/>
+              <a:ext cx="0" cy="192702"/>
+            </a:xfrm>
+            <a:prstGeom prst="line">
+              <a:avLst/>
+            </a:prstGeom>
+            <a:ln w="12700">
+              <a:solidFill>
+                <a:schemeClr val="tx1"/>
+              </a:solidFill>
             </a:ln>
           </p:spPr>
           <p:style>
@@ -3825,10 +4562,10 @@
         </p:cxnSp>
         <p:cxnSp>
           <p:nvCxnSpPr>
-            <p:cNvPr id="24" name="Straight Connector 23">
+            <p:cNvPr id="94" name="Straight Connector 93">
               <a:extLst>
                 <a:ext uri="{FF2B5EF4-FFF2-40B4-BE49-F238E27FC236}">
-                  <a16:creationId xmlns:a16="http://schemas.microsoft.com/office/drawing/2014/main" id="{701380D5-87FA-18D6-C9E2-5BFBD12B6AF6}"/>
+                  <a16:creationId xmlns:a16="http://schemas.microsoft.com/office/drawing/2014/main" id="{8C38EDD6-45C1-D504-77C5-43D725A066B0}"/>
                 </a:ext>
               </a:extLst>
             </p:cNvPr>
@@ -3836,102 +4573,17 @@
             <p:nvPr/>
           </p:nvCxnSpPr>
           <p:spPr>
-            <a:xfrm>
-              <a:off x="1204632" y="5596468"/>
-              <a:ext cx="151202" cy="0"/>
+            <a:xfrm flipV="1">
+              <a:off x="9431113" y="5576482"/>
+              <a:ext cx="0" cy="192702"/>
             </a:xfrm>
             <a:prstGeom prst="line">
               <a:avLst/>
             </a:prstGeom>
-            <a:ln w="19050">
+            <a:ln w="12700">
               <a:solidFill>
                 <a:schemeClr val="tx1"/>
               </a:solidFill>
-              <a:tailEnd w="lg" len="med"/>
-            </a:ln>
-          </p:spPr>
-          <p:style>
-            <a:lnRef idx="1">
-              <a:schemeClr val="accent1"/>
-            </a:lnRef>
-            <a:fillRef idx="0">
-              <a:schemeClr val="accent1"/>
-            </a:fillRef>
-            <a:effectRef idx="0">
-              <a:schemeClr val="accent1"/>
-            </a:effectRef>
-            <a:fontRef idx="minor">
-              <a:schemeClr val="tx1"/>
-            </a:fontRef>
-          </p:style>
-        </p:cxnSp>
-        <p:cxnSp>
-          <p:nvCxnSpPr>
-            <p:cNvPr id="25" name="Straight Connector 24">
-              <a:extLst>
-                <a:ext uri="{FF2B5EF4-FFF2-40B4-BE49-F238E27FC236}">
-                  <a16:creationId xmlns:a16="http://schemas.microsoft.com/office/drawing/2014/main" id="{E1DED060-AA97-3BC2-A954-C1B79EC8C6B0}"/>
-                </a:ext>
-              </a:extLst>
-            </p:cNvPr>
-            <p:cNvCxnSpPr/>
-            <p:nvPr/>
-          </p:nvCxnSpPr>
-          <p:spPr>
-            <a:xfrm>
-              <a:off x="1220397" y="5885499"/>
-              <a:ext cx="151202" cy="0"/>
-            </a:xfrm>
-            <a:prstGeom prst="line">
-              <a:avLst/>
-            </a:prstGeom>
-            <a:ln w="19050">
-              <a:solidFill>
-                <a:schemeClr val="tx1"/>
-              </a:solidFill>
-              <a:tailEnd w="lg" len="med"/>
-            </a:ln>
-          </p:spPr>
-          <p:style>
-            <a:lnRef idx="1">
-              <a:schemeClr val="accent1"/>
-            </a:lnRef>
-            <a:fillRef idx="0">
-              <a:schemeClr val="accent1"/>
-            </a:fillRef>
-            <a:effectRef idx="0">
-              <a:schemeClr val="accent1"/>
-            </a:effectRef>
-            <a:fontRef idx="minor">
-              <a:schemeClr val="tx1"/>
-            </a:fontRef>
-          </p:style>
-        </p:cxnSp>
-        <p:cxnSp>
-          <p:nvCxnSpPr>
-            <p:cNvPr id="27" name="Straight Connector 26">
-              <a:extLst>
-                <a:ext uri="{FF2B5EF4-FFF2-40B4-BE49-F238E27FC236}">
-                  <a16:creationId xmlns:a16="http://schemas.microsoft.com/office/drawing/2014/main" id="{00FE8319-5ECD-03F7-C7DE-D3B157F56021}"/>
-                </a:ext>
-              </a:extLst>
-            </p:cNvPr>
-            <p:cNvCxnSpPr/>
-            <p:nvPr/>
-          </p:nvCxnSpPr>
-          <p:spPr>
-            <a:xfrm flipH="1" flipV="1">
-              <a:off x="1280233" y="5309174"/>
-              <a:ext cx="14300" cy="895065"/>
-            </a:xfrm>
-            <a:prstGeom prst="line">
-              <a:avLst/>
-            </a:prstGeom>
-            <a:ln w="19050">
-              <a:solidFill>
-                <a:schemeClr val="tx1"/>
-              </a:solidFill>
-              <a:tailEnd w="lg" len="med"/>
             </a:ln>
           </p:spPr>
           <p:style>
@@ -3950,607 +4602,6 @@
           </p:style>
         </p:cxnSp>
       </p:grpSp>
-      <p:sp>
-        <p:nvSpPr>
-          <p:cNvPr id="29" name="TextBox 28">
-            <a:extLst>
-              <a:ext uri="{FF2B5EF4-FFF2-40B4-BE49-F238E27FC236}">
-                <a16:creationId xmlns:a16="http://schemas.microsoft.com/office/drawing/2014/main" id="{AD50B506-0CCE-D957-05DB-53AD4001409B}"/>
-              </a:ext>
-            </a:extLst>
-          </p:cNvPr>
-          <p:cNvSpPr txBox="1"/>
-          <p:nvPr/>
-        </p:nvSpPr>
-        <p:spPr>
-          <a:xfrm rot="16200000">
-            <a:off x="2589919" y="5132253"/>
-            <a:ext cx="336952" cy="523220"/>
-          </a:xfrm>
-          <a:prstGeom prst="rect">
-            <a:avLst/>
-          </a:prstGeom>
-          <a:noFill/>
-        </p:spPr>
-        <p:txBody>
-          <a:bodyPr wrap="none" rtlCol="0">
-            <a:spAutoFit/>
-          </a:bodyPr>
-          <a:lstStyle/>
-          <a:p>
-            <a:r>
-              <a:rPr lang="en-US" sz="2800" dirty="0"/>
-              <a:t>c</a:t>
-            </a:r>
-            <a:endParaRPr lang="en-US" sz="2800" baseline="-25000" dirty="0"/>
-          </a:p>
-        </p:txBody>
-      </p:sp>
-      <p:cxnSp>
-        <p:nvCxnSpPr>
-          <p:cNvPr id="30" name="Straight Arrow Connector 29">
-            <a:extLst>
-              <a:ext uri="{FF2B5EF4-FFF2-40B4-BE49-F238E27FC236}">
-                <a16:creationId xmlns:a16="http://schemas.microsoft.com/office/drawing/2014/main" id="{BA8C3651-B6BA-F65D-BBB7-E373D0447BFF}"/>
-              </a:ext>
-              <a:ext uri="{C183D7F6-B498-43B3-948B-1728B52AA6E4}">
-                <adec:decorative xmlns:adec="http://schemas.microsoft.com/office/drawing/2017/decorative" val="1"/>
-              </a:ext>
-            </a:extLst>
-          </p:cNvPr>
-          <p:cNvCxnSpPr>
-            <a:cxnSpLocks/>
-          </p:cNvCxnSpPr>
-          <p:nvPr/>
-        </p:nvCxnSpPr>
-        <p:spPr>
-          <a:xfrm rot="922805" flipH="1" flipV="1">
-            <a:off x="3520967" y="5575739"/>
-            <a:ext cx="157656" cy="599090"/>
-          </a:xfrm>
-          <a:prstGeom prst="straightConnector1">
-            <a:avLst/>
-          </a:prstGeom>
-          <a:ln w="12700">
-            <a:solidFill>
-              <a:schemeClr val="tx1"/>
-            </a:solidFill>
-            <a:headEnd type="triangle" w="lg" len="med"/>
-            <a:tailEnd type="triangle" w="lg" len="med"/>
-          </a:ln>
-        </p:spPr>
-        <p:style>
-          <a:lnRef idx="1">
-            <a:schemeClr val="accent1"/>
-          </a:lnRef>
-          <a:fillRef idx="0">
-            <a:schemeClr val="accent1"/>
-          </a:fillRef>
-          <a:effectRef idx="0">
-            <a:schemeClr val="accent1"/>
-          </a:effectRef>
-          <a:fontRef idx="minor">
-            <a:schemeClr val="tx1"/>
-          </a:fontRef>
-        </p:style>
-      </p:cxnSp>
-      <p:sp>
-        <p:nvSpPr>
-          <p:cNvPr id="31" name="TextBox 30">
-            <a:extLst>
-              <a:ext uri="{FF2B5EF4-FFF2-40B4-BE49-F238E27FC236}">
-                <a16:creationId xmlns:a16="http://schemas.microsoft.com/office/drawing/2014/main" id="{C100E522-A428-E860-9032-A02325A8645C}"/>
-              </a:ext>
-            </a:extLst>
-          </p:cNvPr>
-          <p:cNvSpPr txBox="1"/>
-          <p:nvPr/>
-        </p:nvSpPr>
-        <p:spPr>
-          <a:xfrm rot="65143">
-            <a:off x="3550023" y="5536902"/>
-            <a:ext cx="434734" cy="523220"/>
-          </a:xfrm>
-          <a:prstGeom prst="rect">
-            <a:avLst/>
-          </a:prstGeom>
-          <a:noFill/>
-        </p:spPr>
-        <p:txBody>
-          <a:bodyPr wrap="none" rtlCol="0">
-            <a:spAutoFit/>
-          </a:bodyPr>
-          <a:lstStyle/>
-          <a:p>
-            <a:r>
-              <a:rPr lang="en-US" sz="2800" dirty="0" err="1"/>
-              <a:t>t</a:t>
-            </a:r>
-            <a:r>
-              <a:rPr lang="en-US" sz="2800" baseline="-25000" dirty="0" err="1"/>
-              <a:t>B</a:t>
-            </a:r>
-            <a:endParaRPr lang="en-US" sz="2800" baseline="-25000" dirty="0"/>
-          </a:p>
-        </p:txBody>
-      </p:sp>
-      <p:sp>
-        <p:nvSpPr>
-          <p:cNvPr id="37" name="Arc 36">
-            <a:extLst>
-              <a:ext uri="{FF2B5EF4-FFF2-40B4-BE49-F238E27FC236}">
-                <a16:creationId xmlns:a16="http://schemas.microsoft.com/office/drawing/2014/main" id="{C8B39850-39AE-F326-5494-104A49D62792}"/>
-              </a:ext>
-            </a:extLst>
-          </p:cNvPr>
-          <p:cNvSpPr/>
-          <p:nvPr/>
-        </p:nvSpPr>
-        <p:spPr>
-          <a:xfrm rot="10800000">
-            <a:off x="151623" y="1226578"/>
-            <a:ext cx="5506948" cy="3724383"/>
-          </a:xfrm>
-          <a:prstGeom prst="arc">
-            <a:avLst>
-              <a:gd name="adj1" fmla="val 16576986"/>
-              <a:gd name="adj2" fmla="val 20227163"/>
-            </a:avLst>
-          </a:prstGeom>
-          <a:ln w="28575">
-            <a:prstDash val="sysDash"/>
-          </a:ln>
-        </p:spPr>
-        <p:style>
-          <a:lnRef idx="1">
-            <a:schemeClr val="accent1"/>
-          </a:lnRef>
-          <a:fillRef idx="0">
-            <a:schemeClr val="accent1"/>
-          </a:fillRef>
-          <a:effectRef idx="0">
-            <a:schemeClr val="accent1"/>
-          </a:effectRef>
-          <a:fontRef idx="minor">
-            <a:schemeClr val="tx1"/>
-          </a:fontRef>
-        </p:style>
-        <p:txBody>
-          <a:bodyPr rtlCol="0" anchor="ctr"/>
-          <a:lstStyle/>
-          <a:p>
-            <a:pPr algn="ctr"/>
-            <a:endParaRPr lang="en-US" sz="3600">
-              <a:solidFill>
-                <a:srgbClr val="FF0000"/>
-              </a:solidFill>
-            </a:endParaRPr>
-          </a:p>
-        </p:txBody>
-      </p:sp>
-      <p:cxnSp>
-        <p:nvCxnSpPr>
-          <p:cNvPr id="38" name="Straight Connector 37">
-            <a:extLst>
-              <a:ext uri="{FF2B5EF4-FFF2-40B4-BE49-F238E27FC236}">
-                <a16:creationId xmlns:a16="http://schemas.microsoft.com/office/drawing/2014/main" id="{A7C2578E-45EF-170B-88B3-EFF228F31AC0}"/>
-              </a:ext>
-            </a:extLst>
-          </p:cNvPr>
-          <p:cNvCxnSpPr>
-            <a:cxnSpLocks/>
-          </p:cNvCxnSpPr>
-          <p:nvPr/>
-        </p:nvCxnSpPr>
-        <p:spPr>
-          <a:xfrm flipH="1">
-            <a:off x="4156844" y="5878445"/>
-            <a:ext cx="1337106" cy="0"/>
-          </a:xfrm>
-          <a:prstGeom prst="line">
-            <a:avLst/>
-          </a:prstGeom>
-          <a:ln w="19050">
-            <a:prstDash val="dash"/>
-          </a:ln>
-        </p:spPr>
-        <p:style>
-          <a:lnRef idx="1">
-            <a:schemeClr val="accent1"/>
-          </a:lnRef>
-          <a:fillRef idx="0">
-            <a:schemeClr val="accent1"/>
-          </a:fillRef>
-          <a:effectRef idx="0">
-            <a:schemeClr val="accent1"/>
-          </a:effectRef>
-          <a:fontRef idx="minor">
-            <a:schemeClr val="tx1"/>
-          </a:fontRef>
-        </p:style>
-      </p:cxnSp>
-      <p:sp>
-        <p:nvSpPr>
-          <p:cNvPr id="72" name="Freeform: Shape 71">
-            <a:extLst>
-              <a:ext uri="{FF2B5EF4-FFF2-40B4-BE49-F238E27FC236}">
-                <a16:creationId xmlns:a16="http://schemas.microsoft.com/office/drawing/2014/main" id="{18D0BEDE-3BC5-EDCA-DF48-7F04809A3F0D}"/>
-              </a:ext>
-            </a:extLst>
-          </p:cNvPr>
-          <p:cNvSpPr/>
-          <p:nvPr/>
-        </p:nvSpPr>
-        <p:spPr>
-          <a:xfrm>
-            <a:off x="8569261" y="5069279"/>
-            <a:ext cx="863030" cy="554805"/>
-          </a:xfrm>
-          <a:custGeom>
-            <a:avLst/>
-            <a:gdLst>
-              <a:gd name="connsiteX0" fmla="*/ 0 w 863030"/>
-              <a:gd name="connsiteY0" fmla="*/ 549668 h 554805"/>
-              <a:gd name="connsiteX1" fmla="*/ 71920 w 863030"/>
-              <a:gd name="connsiteY1" fmla="*/ 0 h 554805"/>
-              <a:gd name="connsiteX2" fmla="*/ 863030 w 863030"/>
-              <a:gd name="connsiteY2" fmla="*/ 66782 h 554805"/>
-              <a:gd name="connsiteX3" fmla="*/ 842481 w 863030"/>
-              <a:gd name="connsiteY3" fmla="*/ 554805 h 554805"/>
-              <a:gd name="connsiteX4" fmla="*/ 0 w 863030"/>
-              <a:gd name="connsiteY4" fmla="*/ 549668 h 554805"/>
-            </a:gdLst>
-            <a:ahLst/>
-            <a:cxnLst>
-              <a:cxn ang="0">
-                <a:pos x="connsiteX0" y="connsiteY0"/>
-              </a:cxn>
-              <a:cxn ang="0">
-                <a:pos x="connsiteX1" y="connsiteY1"/>
-              </a:cxn>
-              <a:cxn ang="0">
-                <a:pos x="connsiteX2" y="connsiteY2"/>
-              </a:cxn>
-              <a:cxn ang="0">
-                <a:pos x="connsiteX3" y="connsiteY3"/>
-              </a:cxn>
-              <a:cxn ang="0">
-                <a:pos x="connsiteX4" y="connsiteY4"/>
-              </a:cxn>
-            </a:cxnLst>
-            <a:rect l="l" t="t" r="r" b="b"/>
-            <a:pathLst>
-              <a:path w="863030" h="554805">
-                <a:moveTo>
-                  <a:pt x="0" y="549668"/>
-                </a:moveTo>
-                <a:lnTo>
-                  <a:pt x="71920" y="0"/>
-                </a:lnTo>
-                <a:lnTo>
-                  <a:pt x="863030" y="66782"/>
-                </a:lnTo>
-                <a:lnTo>
-                  <a:pt x="842481" y="554805"/>
-                </a:lnTo>
-                <a:lnTo>
-                  <a:pt x="0" y="549668"/>
-                </a:lnTo>
-                <a:close/>
-              </a:path>
-            </a:pathLst>
-          </a:custGeom>
-          <a:solidFill>
-            <a:srgbClr val="FF8080"/>
-          </a:solidFill>
-          <a:ln>
-            <a:solidFill>
-              <a:schemeClr val="tx1"/>
-            </a:solidFill>
-          </a:ln>
-        </p:spPr>
-        <p:style>
-          <a:lnRef idx="2">
-            <a:schemeClr val="accent1">
-              <a:shade val="50000"/>
-            </a:schemeClr>
-          </a:lnRef>
-          <a:fillRef idx="1">
-            <a:schemeClr val="accent1"/>
-          </a:fillRef>
-          <a:effectRef idx="0">
-            <a:schemeClr val="accent1"/>
-          </a:effectRef>
-          <a:fontRef idx="minor">
-            <a:schemeClr val="lt1"/>
-          </a:fontRef>
-        </p:style>
-        <p:txBody>
-          <a:bodyPr rtlCol="0" anchor="ctr"/>
-          <a:lstStyle/>
-          <a:p>
-            <a:pPr algn="ctr"/>
-            <a:endParaRPr lang="en-US"/>
-          </a:p>
-        </p:txBody>
-      </p:sp>
-      <p:sp>
-        <p:nvSpPr>
-          <p:cNvPr id="73" name="Rectangle 72">
-            <a:extLst>
-              <a:ext uri="{FF2B5EF4-FFF2-40B4-BE49-F238E27FC236}">
-                <a16:creationId xmlns:a16="http://schemas.microsoft.com/office/drawing/2014/main" id="{FAE70DDD-629A-2AB2-BBAF-71C9CE2D9DBC}"/>
-              </a:ext>
-            </a:extLst>
-          </p:cNvPr>
-          <p:cNvSpPr/>
-          <p:nvPr/>
-        </p:nvSpPr>
-        <p:spPr>
-          <a:xfrm>
-            <a:off x="6550389" y="5531616"/>
-            <a:ext cx="5208998" cy="683232"/>
-          </a:xfrm>
-          <a:prstGeom prst="rect">
-            <a:avLst/>
-          </a:prstGeom>
-          <a:solidFill>
-            <a:srgbClr val="E6E6FF"/>
-          </a:solidFill>
-          <a:ln w="19050">
-            <a:solidFill>
-              <a:srgbClr val="A5BCD8"/>
-            </a:solidFill>
-          </a:ln>
-        </p:spPr>
-        <p:style>
-          <a:lnRef idx="2">
-            <a:schemeClr val="accent1">
-              <a:shade val="50000"/>
-            </a:schemeClr>
-          </a:lnRef>
-          <a:fillRef idx="1">
-            <a:schemeClr val="accent1"/>
-          </a:fillRef>
-          <a:effectRef idx="0">
-            <a:schemeClr val="accent1"/>
-          </a:effectRef>
-          <a:fontRef idx="minor">
-            <a:schemeClr val="lt1"/>
-          </a:fontRef>
-        </p:style>
-        <p:txBody>
-          <a:bodyPr rtlCol="0" anchor="ctr"/>
-          <a:lstStyle/>
-          <a:p>
-            <a:pPr algn="ctr"/>
-            <a:endParaRPr lang="en-US"/>
-          </a:p>
-        </p:txBody>
-      </p:sp>
-      <p:sp>
-        <p:nvSpPr>
-          <p:cNvPr id="74" name="Block Arc 73">
-            <a:extLst>
-              <a:ext uri="{FF2B5EF4-FFF2-40B4-BE49-F238E27FC236}">
-                <a16:creationId xmlns:a16="http://schemas.microsoft.com/office/drawing/2014/main" id="{9803AB9A-C6F7-47EC-9D57-6BFE330AE639}"/>
-              </a:ext>
-            </a:extLst>
-          </p:cNvPr>
-          <p:cNvSpPr/>
-          <p:nvPr/>
-        </p:nvSpPr>
-        <p:spPr>
-          <a:xfrm rot="10800000">
-            <a:off x="5918527" y="-114034"/>
-            <a:ext cx="6847727" cy="5337423"/>
-          </a:xfrm>
-          <a:prstGeom prst="blockArc">
-            <a:avLst>
-              <a:gd name="adj1" fmla="val 12865127"/>
-              <a:gd name="adj2" fmla="val 19501939"/>
-              <a:gd name="adj3" fmla="val 11947"/>
-            </a:avLst>
-          </a:prstGeom>
-          <a:solidFill>
-            <a:srgbClr val="99CC66"/>
-          </a:solidFill>
-        </p:spPr>
-        <p:style>
-          <a:lnRef idx="2">
-            <a:schemeClr val="accent1">
-              <a:shade val="50000"/>
-            </a:schemeClr>
-          </a:lnRef>
-          <a:fillRef idx="1">
-            <a:schemeClr val="accent1"/>
-          </a:fillRef>
-          <a:effectRef idx="0">
-            <a:schemeClr val="accent1"/>
-          </a:effectRef>
-          <a:fontRef idx="minor">
-            <a:schemeClr val="lt1"/>
-          </a:fontRef>
-        </p:style>
-        <p:txBody>
-          <a:bodyPr rtlCol="0" anchor="ctr"/>
-          <a:lstStyle/>
-          <a:p>
-            <a:pPr algn="ctr"/>
-            <a:endParaRPr lang="en-US">
-              <a:solidFill>
-                <a:schemeClr val="tx1"/>
-              </a:solidFill>
-            </a:endParaRPr>
-          </a:p>
-        </p:txBody>
-      </p:sp>
-      <p:cxnSp>
-        <p:nvCxnSpPr>
-          <p:cNvPr id="86" name="Straight Arrow Connector 85">
-            <a:extLst>
-              <a:ext uri="{FF2B5EF4-FFF2-40B4-BE49-F238E27FC236}">
-                <a16:creationId xmlns:a16="http://schemas.microsoft.com/office/drawing/2014/main" id="{EBEE6CF5-D55D-D491-2D90-DA2434D26E56}"/>
-              </a:ext>
-              <a:ext uri="{C183D7F6-B498-43B3-948B-1728B52AA6E4}">
-                <adec:decorative xmlns:adec="http://schemas.microsoft.com/office/drawing/2017/decorative" val="1"/>
-              </a:ext>
-            </a:extLst>
-          </p:cNvPr>
-          <p:cNvCxnSpPr>
-            <a:cxnSpLocks/>
-          </p:cNvCxnSpPr>
-          <p:nvPr/>
-        </p:nvCxnSpPr>
-        <p:spPr>
-          <a:xfrm flipH="1">
-            <a:off x="8569261" y="5662993"/>
-            <a:ext cx="863030" cy="0"/>
-          </a:xfrm>
-          <a:prstGeom prst="straightConnector1">
-            <a:avLst/>
-          </a:prstGeom>
-          <a:ln w="12700">
-            <a:solidFill>
-              <a:schemeClr val="tx1"/>
-            </a:solidFill>
-            <a:headEnd type="triangle" w="lg" len="med"/>
-            <a:tailEnd type="triangle" w="lg" len="med"/>
-          </a:ln>
-        </p:spPr>
-        <p:style>
-          <a:lnRef idx="1">
-            <a:schemeClr val="accent1"/>
-          </a:lnRef>
-          <a:fillRef idx="0">
-            <a:schemeClr val="accent1"/>
-          </a:fillRef>
-          <a:effectRef idx="0">
-            <a:schemeClr val="accent1"/>
-          </a:effectRef>
-          <a:fontRef idx="minor">
-            <a:schemeClr val="tx1"/>
-          </a:fontRef>
-        </p:style>
-      </p:cxnSp>
-      <p:sp>
-        <p:nvSpPr>
-          <p:cNvPr id="87" name="TextBox 86">
-            <a:extLst>
-              <a:ext uri="{FF2B5EF4-FFF2-40B4-BE49-F238E27FC236}">
-                <a16:creationId xmlns:a16="http://schemas.microsoft.com/office/drawing/2014/main" id="{75B7EEE4-43A4-AEB1-01D3-3E795FBE3B08}"/>
-              </a:ext>
-            </a:extLst>
-          </p:cNvPr>
-          <p:cNvSpPr txBox="1"/>
-          <p:nvPr/>
-        </p:nvSpPr>
-        <p:spPr>
-          <a:xfrm rot="65143">
-            <a:off x="8833143" y="5216379"/>
-            <a:ext cx="373820" cy="523220"/>
-          </a:xfrm>
-          <a:prstGeom prst="rect">
-            <a:avLst/>
-          </a:prstGeom>
-          <a:noFill/>
-        </p:spPr>
-        <p:txBody>
-          <a:bodyPr wrap="none" rtlCol="0">
-            <a:spAutoFit/>
-          </a:bodyPr>
-          <a:lstStyle/>
-          <a:p>
-            <a:r>
-              <a:rPr lang="en-US" sz="2800" dirty="0"/>
-              <a:t>b</a:t>
-            </a:r>
-            <a:endParaRPr lang="en-US" sz="2800" baseline="-25000" dirty="0"/>
-          </a:p>
-        </p:txBody>
-      </p:sp>
-      <p:cxnSp>
-        <p:nvCxnSpPr>
-          <p:cNvPr id="93" name="Straight Connector 92">
-            <a:extLst>
-              <a:ext uri="{FF2B5EF4-FFF2-40B4-BE49-F238E27FC236}">
-                <a16:creationId xmlns:a16="http://schemas.microsoft.com/office/drawing/2014/main" id="{A67BE271-10EE-64DE-F1A6-D2DF281BECCE}"/>
-              </a:ext>
-            </a:extLst>
-          </p:cNvPr>
-          <p:cNvCxnSpPr/>
-          <p:nvPr/>
-        </p:nvCxnSpPr>
-        <p:spPr>
-          <a:xfrm flipV="1">
-            <a:off x="8569261" y="5581735"/>
-            <a:ext cx="0" cy="192702"/>
-          </a:xfrm>
-          <a:prstGeom prst="line">
-            <a:avLst/>
-          </a:prstGeom>
-          <a:ln w="12700">
-            <a:solidFill>
-              <a:schemeClr val="tx1"/>
-            </a:solidFill>
-          </a:ln>
-        </p:spPr>
-        <p:style>
-          <a:lnRef idx="1">
-            <a:schemeClr val="accent1"/>
-          </a:lnRef>
-          <a:fillRef idx="0">
-            <a:schemeClr val="accent1"/>
-          </a:fillRef>
-          <a:effectRef idx="0">
-            <a:schemeClr val="accent1"/>
-          </a:effectRef>
-          <a:fontRef idx="minor">
-            <a:schemeClr val="tx1"/>
-          </a:fontRef>
-        </p:style>
-      </p:cxnSp>
-      <p:cxnSp>
-        <p:nvCxnSpPr>
-          <p:cNvPr id="94" name="Straight Connector 93">
-            <a:extLst>
-              <a:ext uri="{FF2B5EF4-FFF2-40B4-BE49-F238E27FC236}">
-                <a16:creationId xmlns:a16="http://schemas.microsoft.com/office/drawing/2014/main" id="{8C38EDD6-45C1-D504-77C5-43D725A066B0}"/>
-              </a:ext>
-            </a:extLst>
-          </p:cNvPr>
-          <p:cNvCxnSpPr/>
-          <p:nvPr/>
-        </p:nvCxnSpPr>
-        <p:spPr>
-          <a:xfrm flipV="1">
-            <a:off x="9431113" y="5576482"/>
-            <a:ext cx="0" cy="192702"/>
-          </a:xfrm>
-          <a:prstGeom prst="line">
-            <a:avLst/>
-          </a:prstGeom>
-          <a:ln w="12700">
-            <a:solidFill>
-              <a:schemeClr val="tx1"/>
-            </a:solidFill>
-          </a:ln>
-        </p:spPr>
-        <p:style>
-          <a:lnRef idx="1">
-            <a:schemeClr val="accent1"/>
-          </a:lnRef>
-          <a:fillRef idx="0">
-            <a:schemeClr val="accent1"/>
-          </a:fillRef>
-          <a:effectRef idx="0">
-            <a:schemeClr val="accent1"/>
-          </a:effectRef>
-          <a:fontRef idx="minor">
-            <a:schemeClr val="tx1"/>
-          </a:fontRef>
-        </p:style>
-      </p:cxnSp>
     </p:spTree>
     <p:extLst>
       <p:ext uri="{BB962C8B-B14F-4D97-AF65-F5344CB8AC3E}">

</xml_diff>